<commit_message>
Qupls4 - doc update
</commit_message>
<xml_diff>
--- a/rtl/cpu_v4/doc/Qupls4.pptx
+++ b/rtl/cpu_v4/doc/Qupls4.pptx
@@ -16,6 +16,9 @@
     <p:sldId id="263" r:id="rId10"/>
     <p:sldId id="265" r:id="rId11"/>
     <p:sldId id="266" r:id="rId12"/>
+    <p:sldId id="267" r:id="rId13"/>
+    <p:sldId id="268" r:id="rId14"/>
+    <p:sldId id="269" r:id="rId15"/>
   </p:sldIdLst>
   <p:sldSz cx="12192000" cy="6858000"/>
   <p:notesSz cx="6858000" cy="9144000"/>
@@ -122,12 +125,20 @@
 </p:presentation>
 </file>
 
+<file path=ppt/revisionInfo.xml><?xml version="1.0" encoding="utf-8"?>
+<p1510:revInfo xmlns:a="http://schemas.openxmlformats.org/drawingml/2006/main" xmlns:r="http://schemas.openxmlformats.org/officeDocument/2006/relationships" xmlns:p1510="http://schemas.microsoft.com/office/powerpoint/2015/10/main">
+  <p1510:revLst>
+    <p1510:client id="{530FFA59-183F-4364-BD66-BC6B6EDC579B}" v="22" dt="2025-12-04T09:19:01.744"/>
+  </p1510:revLst>
+</p1510:revInfo>
+</file>
+
 <file path=ppt/changesInfos/changesInfo1.xml><?xml version="1.0" encoding="utf-8"?>
 <pc:chgInfo xmlns:a="http://schemas.openxmlformats.org/drawingml/2006/main" xmlns:r="http://schemas.openxmlformats.org/officeDocument/2006/relationships" xmlns:ac="http://schemas.microsoft.com/office/drawing/2013/main/command" xmlns:pc="http://schemas.microsoft.com/office/powerpoint/2013/main/command">
   <pc:docChgLst>
     <pc:chgData name="Robert Finch" userId="360118edfabb5ba6" providerId="LiveId" clId="{940D50E2-FEDC-434C-83CF-A13052851249}"/>
-    <pc:docChg chg="modSld">
-      <pc:chgData name="Robert Finch" userId="360118edfabb5ba6" providerId="LiveId" clId="{940D50E2-FEDC-434C-83CF-A13052851249}" dt="2025-12-01T12:31:35.416" v="23" actId="20577"/>
+    <pc:docChg chg="undo custSel addSld modSld">
+      <pc:chgData name="Robert Finch" userId="360118edfabb5ba6" providerId="LiveId" clId="{940D50E2-FEDC-434C-83CF-A13052851249}" dt="2025-12-04T09:21:16.062" v="1078" actId="20577"/>
       <pc:docMkLst>
         <pc:docMk/>
       </pc:docMkLst>
@@ -251,6 +262,435 @@
           </ac:spMkLst>
         </pc:spChg>
       </pc:sldChg>
+      <pc:sldChg chg="addSp delSp modSp new mod">
+        <pc:chgData name="Robert Finch" userId="360118edfabb5ba6" providerId="LiveId" clId="{940D50E2-FEDC-434C-83CF-A13052851249}" dt="2025-12-04T09:03:59.136" v="599" actId="1076"/>
+        <pc:sldMkLst>
+          <pc:docMk/>
+          <pc:sldMk cId="2700656055" sldId="267"/>
+        </pc:sldMkLst>
+        <pc:spChg chg="mod">
+          <ac:chgData name="Robert Finch" userId="360118edfabb5ba6" providerId="LiveId" clId="{940D50E2-FEDC-434C-83CF-A13052851249}" dt="2025-12-04T09:03:31.095" v="598" actId="20577"/>
+          <ac:spMkLst>
+            <pc:docMk/>
+            <pc:sldMk cId="2700656055" sldId="267"/>
+            <ac:spMk id="2" creationId="{3050B25B-2706-8EB3-02AB-0A78B390E4B3}"/>
+          </ac:spMkLst>
+        </pc:spChg>
+        <pc:spChg chg="del">
+          <ac:chgData name="Robert Finch" userId="360118edfabb5ba6" providerId="LiveId" clId="{940D50E2-FEDC-434C-83CF-A13052851249}" dt="2025-12-04T08:49:26.314" v="64" actId="478"/>
+          <ac:spMkLst>
+            <pc:docMk/>
+            <pc:sldMk cId="2700656055" sldId="267"/>
+            <ac:spMk id="3" creationId="{0556690B-4863-7727-0044-3A22659DF417}"/>
+          </ac:spMkLst>
+        </pc:spChg>
+        <pc:spChg chg="add mod">
+          <ac:chgData name="Robert Finch" userId="360118edfabb5ba6" providerId="LiveId" clId="{940D50E2-FEDC-434C-83CF-A13052851249}" dt="2025-12-04T09:03:59.136" v="599" actId="1076"/>
+          <ac:spMkLst>
+            <pc:docMk/>
+            <pc:sldMk cId="2700656055" sldId="267"/>
+            <ac:spMk id="4" creationId="{F986A818-5AB2-A7B3-9AD5-B50500991B27}"/>
+          </ac:spMkLst>
+        </pc:spChg>
+        <pc:spChg chg="add mod">
+          <ac:chgData name="Robert Finch" userId="360118edfabb5ba6" providerId="LiveId" clId="{940D50E2-FEDC-434C-83CF-A13052851249}" dt="2025-12-04T09:03:59.136" v="599" actId="1076"/>
+          <ac:spMkLst>
+            <pc:docMk/>
+            <pc:sldMk cId="2700656055" sldId="267"/>
+            <ac:spMk id="5" creationId="{FD67CC3A-4FBC-0F72-3350-2386E8D8A3DB}"/>
+          </ac:spMkLst>
+        </pc:spChg>
+        <pc:spChg chg="add mod">
+          <ac:chgData name="Robert Finch" userId="360118edfabb5ba6" providerId="LiveId" clId="{940D50E2-FEDC-434C-83CF-A13052851249}" dt="2025-12-04T09:03:59.136" v="599" actId="1076"/>
+          <ac:spMkLst>
+            <pc:docMk/>
+            <pc:sldMk cId="2700656055" sldId="267"/>
+            <ac:spMk id="6" creationId="{DC743D58-4896-F445-BD37-78B7612220A2}"/>
+          </ac:spMkLst>
+        </pc:spChg>
+        <pc:spChg chg="add mod">
+          <ac:chgData name="Robert Finch" userId="360118edfabb5ba6" providerId="LiveId" clId="{940D50E2-FEDC-434C-83CF-A13052851249}" dt="2025-12-04T08:55:10.465" v="305" actId="1076"/>
+          <ac:spMkLst>
+            <pc:docMk/>
+            <pc:sldMk cId="2700656055" sldId="267"/>
+            <ac:spMk id="7" creationId="{6F22FAFC-519B-CDE9-3A1A-0C2D12FEFDE7}"/>
+          </ac:spMkLst>
+        </pc:spChg>
+        <pc:spChg chg="add mod">
+          <ac:chgData name="Robert Finch" userId="360118edfabb5ba6" providerId="LiveId" clId="{940D50E2-FEDC-434C-83CF-A13052851249}" dt="2025-12-04T09:03:59.136" v="599" actId="1076"/>
+          <ac:spMkLst>
+            <pc:docMk/>
+            <pc:sldMk cId="2700656055" sldId="267"/>
+            <ac:spMk id="8" creationId="{C50FC78B-1F47-1554-32F3-B4790B90773E}"/>
+          </ac:spMkLst>
+        </pc:spChg>
+        <pc:spChg chg="add mod">
+          <ac:chgData name="Robert Finch" userId="360118edfabb5ba6" providerId="LiveId" clId="{940D50E2-FEDC-434C-83CF-A13052851249}" dt="2025-12-04T08:55:26.409" v="309" actId="14100"/>
+          <ac:spMkLst>
+            <pc:docMk/>
+            <pc:sldMk cId="2700656055" sldId="267"/>
+            <ac:spMk id="9" creationId="{0C2F6C3F-EC1A-0305-A8BD-AFF525B3953A}"/>
+          </ac:spMkLst>
+        </pc:spChg>
+        <pc:spChg chg="add mod">
+          <ac:chgData name="Robert Finch" userId="360118edfabb5ba6" providerId="LiveId" clId="{940D50E2-FEDC-434C-83CF-A13052851249}" dt="2025-12-04T08:55:33.269" v="310" actId="1076"/>
+          <ac:spMkLst>
+            <pc:docMk/>
+            <pc:sldMk cId="2700656055" sldId="267"/>
+            <ac:spMk id="10" creationId="{4D37097F-8AFF-23C8-015D-7086C5FE92ED}"/>
+          </ac:spMkLst>
+        </pc:spChg>
+        <pc:spChg chg="add mod">
+          <ac:chgData name="Robert Finch" userId="360118edfabb5ba6" providerId="LiveId" clId="{940D50E2-FEDC-434C-83CF-A13052851249}" dt="2025-12-04T09:03:59.136" v="599" actId="1076"/>
+          <ac:spMkLst>
+            <pc:docMk/>
+            <pc:sldMk cId="2700656055" sldId="267"/>
+            <ac:spMk id="11" creationId="{198D87D7-5214-4CCF-D911-C164BE726316}"/>
+          </ac:spMkLst>
+        </pc:spChg>
+        <pc:spChg chg="add mod">
+          <ac:chgData name="Robert Finch" userId="360118edfabb5ba6" providerId="LiveId" clId="{940D50E2-FEDC-434C-83CF-A13052851249}" dt="2025-12-04T09:03:59.136" v="599" actId="1076"/>
+          <ac:spMkLst>
+            <pc:docMk/>
+            <pc:sldMk cId="2700656055" sldId="267"/>
+            <ac:spMk id="12" creationId="{6D35E58A-D186-7F4C-F385-BB8058D5006A}"/>
+          </ac:spMkLst>
+        </pc:spChg>
+        <pc:spChg chg="add mod">
+          <ac:chgData name="Robert Finch" userId="360118edfabb5ba6" providerId="LiveId" clId="{940D50E2-FEDC-434C-83CF-A13052851249}" dt="2025-12-04T09:03:59.136" v="599" actId="1076"/>
+          <ac:spMkLst>
+            <pc:docMk/>
+            <pc:sldMk cId="2700656055" sldId="267"/>
+            <ac:spMk id="13" creationId="{12BB82C7-FF8B-4CC1-B399-7617E39E8291}"/>
+          </ac:spMkLst>
+        </pc:spChg>
+        <pc:spChg chg="add mod">
+          <ac:chgData name="Robert Finch" userId="360118edfabb5ba6" providerId="LiveId" clId="{940D50E2-FEDC-434C-83CF-A13052851249}" dt="2025-12-04T09:03:59.136" v="599" actId="1076"/>
+          <ac:spMkLst>
+            <pc:docMk/>
+            <pc:sldMk cId="2700656055" sldId="267"/>
+            <ac:spMk id="14" creationId="{3480C16B-509C-8C47-4F5B-BD33BBEC341C}"/>
+          </ac:spMkLst>
+        </pc:spChg>
+        <pc:spChg chg="add mod">
+          <ac:chgData name="Robert Finch" userId="360118edfabb5ba6" providerId="LiveId" clId="{940D50E2-FEDC-434C-83CF-A13052851249}" dt="2025-12-04T09:03:59.136" v="599" actId="1076"/>
+          <ac:spMkLst>
+            <pc:docMk/>
+            <pc:sldMk cId="2700656055" sldId="267"/>
+            <ac:spMk id="15" creationId="{526F122C-2B42-9A9B-F869-E7C10C736D74}"/>
+          </ac:spMkLst>
+        </pc:spChg>
+        <pc:spChg chg="add mod">
+          <ac:chgData name="Robert Finch" userId="360118edfabb5ba6" providerId="LiveId" clId="{940D50E2-FEDC-434C-83CF-A13052851249}" dt="2025-12-04T08:58:05.214" v="405" actId="1076"/>
+          <ac:spMkLst>
+            <pc:docMk/>
+            <pc:sldMk cId="2700656055" sldId="267"/>
+            <ac:spMk id="16" creationId="{2F909C33-040A-7EE5-16BB-8F7A9D2050AA}"/>
+          </ac:spMkLst>
+        </pc:spChg>
+        <pc:spChg chg="add mod">
+          <ac:chgData name="Robert Finch" userId="360118edfabb5ba6" providerId="LiveId" clId="{940D50E2-FEDC-434C-83CF-A13052851249}" dt="2025-12-04T08:58:57.067" v="409" actId="692"/>
+          <ac:spMkLst>
+            <pc:docMk/>
+            <pc:sldMk cId="2700656055" sldId="267"/>
+            <ac:spMk id="17" creationId="{4161D8EA-02BC-53C3-E9AA-F7B0A2CBBA15}"/>
+          </ac:spMkLst>
+        </pc:spChg>
+        <pc:spChg chg="add mod">
+          <ac:chgData name="Robert Finch" userId="360118edfabb5ba6" providerId="LiveId" clId="{940D50E2-FEDC-434C-83CF-A13052851249}" dt="2025-12-04T08:59:18.188" v="411" actId="1076"/>
+          <ac:spMkLst>
+            <pc:docMk/>
+            <pc:sldMk cId="2700656055" sldId="267"/>
+            <ac:spMk id="18" creationId="{92EC0335-84F6-6C7A-0E1D-12500B773CEA}"/>
+          </ac:spMkLst>
+        </pc:spChg>
+        <pc:spChg chg="add mod">
+          <ac:chgData name="Robert Finch" userId="360118edfabb5ba6" providerId="LiveId" clId="{940D50E2-FEDC-434C-83CF-A13052851249}" dt="2025-12-04T09:03:59.136" v="599" actId="1076"/>
+          <ac:spMkLst>
+            <pc:docMk/>
+            <pc:sldMk cId="2700656055" sldId="267"/>
+            <ac:spMk id="19" creationId="{3684DD6F-A379-44E7-BC7B-D763C4617FE4}"/>
+          </ac:spMkLst>
+        </pc:spChg>
+        <pc:spChg chg="add mod">
+          <ac:chgData name="Robert Finch" userId="360118edfabb5ba6" providerId="LiveId" clId="{940D50E2-FEDC-434C-83CF-A13052851249}" dt="2025-12-04T09:03:17.178" v="580" actId="1076"/>
+          <ac:spMkLst>
+            <pc:docMk/>
+            <pc:sldMk cId="2700656055" sldId="267"/>
+            <ac:spMk id="53" creationId="{C19E7C1D-A9AD-16AA-A100-257115DA4B9E}"/>
+          </ac:spMkLst>
+        </pc:spChg>
+        <pc:cxnChg chg="add">
+          <ac:chgData name="Robert Finch" userId="360118edfabb5ba6" providerId="LiveId" clId="{940D50E2-FEDC-434C-83CF-A13052851249}" dt="2025-12-04T08:59:58.033" v="430" actId="11529"/>
+          <ac:cxnSpMkLst>
+            <pc:docMk/>
+            <pc:sldMk cId="2700656055" sldId="267"/>
+            <ac:cxnSpMk id="21" creationId="{6320FC7F-FFE0-5024-14C0-16F6373EAEBB}"/>
+          </ac:cxnSpMkLst>
+        </pc:cxnChg>
+        <pc:cxnChg chg="add">
+          <ac:chgData name="Robert Finch" userId="360118edfabb5ba6" providerId="LiveId" clId="{940D50E2-FEDC-434C-83CF-A13052851249}" dt="2025-12-04T09:00:05.094" v="431" actId="11529"/>
+          <ac:cxnSpMkLst>
+            <pc:docMk/>
+            <pc:sldMk cId="2700656055" sldId="267"/>
+            <ac:cxnSpMk id="23" creationId="{869BF54E-88AA-55C7-2ED9-B3A7524AFD41}"/>
+          </ac:cxnSpMkLst>
+        </pc:cxnChg>
+        <pc:cxnChg chg="add">
+          <ac:chgData name="Robert Finch" userId="360118edfabb5ba6" providerId="LiveId" clId="{940D50E2-FEDC-434C-83CF-A13052851249}" dt="2025-12-04T09:00:10.835" v="432" actId="11529"/>
+          <ac:cxnSpMkLst>
+            <pc:docMk/>
+            <pc:sldMk cId="2700656055" sldId="267"/>
+            <ac:cxnSpMk id="25" creationId="{AD786A4B-5358-39A6-A057-ECFE46A8CE54}"/>
+          </ac:cxnSpMkLst>
+        </pc:cxnChg>
+        <pc:cxnChg chg="add">
+          <ac:chgData name="Robert Finch" userId="360118edfabb5ba6" providerId="LiveId" clId="{940D50E2-FEDC-434C-83CF-A13052851249}" dt="2025-12-04T09:00:16.784" v="433" actId="11529"/>
+          <ac:cxnSpMkLst>
+            <pc:docMk/>
+            <pc:sldMk cId="2700656055" sldId="267"/>
+            <ac:cxnSpMk id="27" creationId="{10C91033-4BB2-E910-2101-054F7F2DB614}"/>
+          </ac:cxnSpMkLst>
+        </pc:cxnChg>
+        <pc:cxnChg chg="add">
+          <ac:chgData name="Robert Finch" userId="360118edfabb5ba6" providerId="LiveId" clId="{940D50E2-FEDC-434C-83CF-A13052851249}" dt="2025-12-04T09:00:24.094" v="434" actId="11529"/>
+          <ac:cxnSpMkLst>
+            <pc:docMk/>
+            <pc:sldMk cId="2700656055" sldId="267"/>
+            <ac:cxnSpMk id="29" creationId="{7B964511-601F-90A7-48C2-DC3D4E6EA607}"/>
+          </ac:cxnSpMkLst>
+        </pc:cxnChg>
+        <pc:cxnChg chg="add">
+          <ac:chgData name="Robert Finch" userId="360118edfabb5ba6" providerId="LiveId" clId="{940D50E2-FEDC-434C-83CF-A13052851249}" dt="2025-12-04T09:00:29.874" v="435" actId="11529"/>
+          <ac:cxnSpMkLst>
+            <pc:docMk/>
+            <pc:sldMk cId="2700656055" sldId="267"/>
+            <ac:cxnSpMk id="31" creationId="{7506FB71-2337-89CB-835B-EC15D2291E54}"/>
+          </ac:cxnSpMkLst>
+        </pc:cxnChg>
+        <pc:cxnChg chg="add">
+          <ac:chgData name="Robert Finch" userId="360118edfabb5ba6" providerId="LiveId" clId="{940D50E2-FEDC-434C-83CF-A13052851249}" dt="2025-12-04T09:00:36.088" v="436" actId="11529"/>
+          <ac:cxnSpMkLst>
+            <pc:docMk/>
+            <pc:sldMk cId="2700656055" sldId="267"/>
+            <ac:cxnSpMk id="33" creationId="{1FABF2A9-5106-1EC2-FC6A-669CA5802D3D}"/>
+          </ac:cxnSpMkLst>
+        </pc:cxnChg>
+        <pc:cxnChg chg="add">
+          <ac:chgData name="Robert Finch" userId="360118edfabb5ba6" providerId="LiveId" clId="{940D50E2-FEDC-434C-83CF-A13052851249}" dt="2025-12-04T09:00:42.037" v="437" actId="11529"/>
+          <ac:cxnSpMkLst>
+            <pc:docMk/>
+            <pc:sldMk cId="2700656055" sldId="267"/>
+            <ac:cxnSpMk id="35" creationId="{8BAAD784-FE55-0FB6-3124-959CF9453124}"/>
+          </ac:cxnSpMkLst>
+        </pc:cxnChg>
+        <pc:cxnChg chg="add mod">
+          <ac:chgData name="Robert Finch" userId="360118edfabb5ba6" providerId="LiveId" clId="{940D50E2-FEDC-434C-83CF-A13052851249}" dt="2025-12-04T09:00:51.816" v="439" actId="14100"/>
+          <ac:cxnSpMkLst>
+            <pc:docMk/>
+            <pc:sldMk cId="2700656055" sldId="267"/>
+            <ac:cxnSpMk id="37" creationId="{E447E4B4-30D8-9E72-06DA-F9F6E108A9EB}"/>
+          </ac:cxnSpMkLst>
+        </pc:cxnChg>
+        <pc:cxnChg chg="add">
+          <ac:chgData name="Robert Finch" userId="360118edfabb5ba6" providerId="LiveId" clId="{940D50E2-FEDC-434C-83CF-A13052851249}" dt="2025-12-04T09:00:58.037" v="440" actId="11529"/>
+          <ac:cxnSpMkLst>
+            <pc:docMk/>
+            <pc:sldMk cId="2700656055" sldId="267"/>
+            <ac:cxnSpMk id="40" creationId="{4369600B-BABA-FE32-1D1E-1B7FD4A12A14}"/>
+          </ac:cxnSpMkLst>
+        </pc:cxnChg>
+        <pc:cxnChg chg="add">
+          <ac:chgData name="Robert Finch" userId="360118edfabb5ba6" providerId="LiveId" clId="{940D50E2-FEDC-434C-83CF-A13052851249}" dt="2025-12-04T09:01:06.913" v="441" actId="11529"/>
+          <ac:cxnSpMkLst>
+            <pc:docMk/>
+            <pc:sldMk cId="2700656055" sldId="267"/>
+            <ac:cxnSpMk id="42" creationId="{38DAB157-687B-FA64-ABF1-DECCC302E095}"/>
+          </ac:cxnSpMkLst>
+        </pc:cxnChg>
+        <pc:cxnChg chg="add">
+          <ac:chgData name="Robert Finch" userId="360118edfabb5ba6" providerId="LiveId" clId="{940D50E2-FEDC-434C-83CF-A13052851249}" dt="2025-12-04T09:01:13.046" v="442" actId="11529"/>
+          <ac:cxnSpMkLst>
+            <pc:docMk/>
+            <pc:sldMk cId="2700656055" sldId="267"/>
+            <ac:cxnSpMk id="44" creationId="{F596A18D-32F1-55FE-B292-C63A7CDDAAFF}"/>
+          </ac:cxnSpMkLst>
+        </pc:cxnChg>
+        <pc:cxnChg chg="add">
+          <ac:chgData name="Robert Finch" userId="360118edfabb5ba6" providerId="LiveId" clId="{940D50E2-FEDC-434C-83CF-A13052851249}" dt="2025-12-04T09:01:19.211" v="443" actId="11529"/>
+          <ac:cxnSpMkLst>
+            <pc:docMk/>
+            <pc:sldMk cId="2700656055" sldId="267"/>
+            <ac:cxnSpMk id="46" creationId="{2C833420-1047-3D23-BE0A-48A352A431B1}"/>
+          </ac:cxnSpMkLst>
+        </pc:cxnChg>
+        <pc:cxnChg chg="add">
+          <ac:chgData name="Robert Finch" userId="360118edfabb5ba6" providerId="LiveId" clId="{940D50E2-FEDC-434C-83CF-A13052851249}" dt="2025-12-04T09:01:27.935" v="444" actId="11529"/>
+          <ac:cxnSpMkLst>
+            <pc:docMk/>
+            <pc:sldMk cId="2700656055" sldId="267"/>
+            <ac:cxnSpMk id="48" creationId="{D4BC2AE6-1A92-0F7F-1056-54E42B947BFF}"/>
+          </ac:cxnSpMkLst>
+        </pc:cxnChg>
+        <pc:cxnChg chg="add mod">
+          <ac:chgData name="Robert Finch" userId="360118edfabb5ba6" providerId="LiveId" clId="{940D50E2-FEDC-434C-83CF-A13052851249}" dt="2025-12-04T09:01:43.189" v="446" actId="692"/>
+          <ac:cxnSpMkLst>
+            <pc:docMk/>
+            <pc:sldMk cId="2700656055" sldId="267"/>
+            <ac:cxnSpMk id="50" creationId="{E3FE8526-AF2E-5DA2-36AF-D77B3DB40004}"/>
+          </ac:cxnSpMkLst>
+        </pc:cxnChg>
+        <pc:cxnChg chg="add mod">
+          <ac:chgData name="Robert Finch" userId="360118edfabb5ba6" providerId="LiveId" clId="{940D50E2-FEDC-434C-83CF-A13052851249}" dt="2025-12-04T09:01:54.438" v="448" actId="692"/>
+          <ac:cxnSpMkLst>
+            <pc:docMk/>
+            <pc:sldMk cId="2700656055" sldId="267"/>
+            <ac:cxnSpMk id="52" creationId="{14FBF3B3-3CB4-E90E-723D-28BCCFAF5D51}"/>
+          </ac:cxnSpMkLst>
+        </pc:cxnChg>
+      </pc:sldChg>
+      <pc:sldChg chg="modSp add mod">
+        <pc:chgData name="Robert Finch" userId="360118edfabb5ba6" providerId="LiveId" clId="{940D50E2-FEDC-434C-83CF-A13052851249}" dt="2025-12-04T08:22:15.045" v="32" actId="1076"/>
+        <pc:sldMkLst>
+          <pc:docMk/>
+          <pc:sldMk cId="3761679462" sldId="268"/>
+        </pc:sldMkLst>
+        <pc:spChg chg="mod">
+          <ac:chgData name="Robert Finch" userId="360118edfabb5ba6" providerId="LiveId" clId="{940D50E2-FEDC-434C-83CF-A13052851249}" dt="2025-12-04T08:21:49.321" v="31" actId="20577"/>
+          <ac:spMkLst>
+            <pc:docMk/>
+            <pc:sldMk cId="3761679462" sldId="268"/>
+            <ac:spMk id="2" creationId="{DE61D225-C030-A88E-9267-DF070E4D0FE1}"/>
+          </ac:spMkLst>
+        </pc:spChg>
+        <pc:spChg chg="mod">
+          <ac:chgData name="Robert Finch" userId="360118edfabb5ba6" providerId="LiveId" clId="{940D50E2-FEDC-434C-83CF-A13052851249}" dt="2025-12-04T08:22:15.045" v="32" actId="1076"/>
+          <ac:spMkLst>
+            <pc:docMk/>
+            <pc:sldMk cId="3761679462" sldId="268"/>
+            <ac:spMk id="26" creationId="{9A0E7198-4FB0-5949-B7AA-D94862E804D7}"/>
+          </ac:spMkLst>
+        </pc:spChg>
+      </pc:sldChg>
+      <pc:sldChg chg="addSp delSp modSp new mod">
+        <pc:chgData name="Robert Finch" userId="360118edfabb5ba6" providerId="LiveId" clId="{940D50E2-FEDC-434C-83CF-A13052851249}" dt="2025-12-04T09:21:16.062" v="1078" actId="20577"/>
+        <pc:sldMkLst>
+          <pc:docMk/>
+          <pc:sldMk cId="3910026719" sldId="269"/>
+        </pc:sldMkLst>
+        <pc:spChg chg="mod">
+          <ac:chgData name="Robert Finch" userId="360118edfabb5ba6" providerId="LiveId" clId="{940D50E2-FEDC-434C-83CF-A13052851249}" dt="2025-12-04T09:14:30.557" v="623" actId="1076"/>
+          <ac:spMkLst>
+            <pc:docMk/>
+            <pc:sldMk cId="3910026719" sldId="269"/>
+            <ac:spMk id="2" creationId="{2F4E9D32-C6B7-28EF-74CE-15F8FFD098ED}"/>
+          </ac:spMkLst>
+        </pc:spChg>
+        <pc:spChg chg="del">
+          <ac:chgData name="Robert Finch" userId="360118edfabb5ba6" providerId="LiveId" clId="{940D50E2-FEDC-434C-83CF-A13052851249}" dt="2025-12-04T09:14:38.359" v="624" actId="478"/>
+          <ac:spMkLst>
+            <pc:docMk/>
+            <pc:sldMk cId="3910026719" sldId="269"/>
+            <ac:spMk id="3" creationId="{7C139721-CE9C-011C-3D58-2B4CB54C4EDB}"/>
+          </ac:spMkLst>
+        </pc:spChg>
+        <pc:spChg chg="add mod">
+          <ac:chgData name="Robert Finch" userId="360118edfabb5ba6" providerId="LiveId" clId="{940D50E2-FEDC-434C-83CF-A13052851249}" dt="2025-12-04T09:18:39.432" v="867" actId="1076"/>
+          <ac:spMkLst>
+            <pc:docMk/>
+            <pc:sldMk cId="3910026719" sldId="269"/>
+            <ac:spMk id="4" creationId="{6864A1F2-123A-850B-3B21-47F855914C43}"/>
+          </ac:spMkLst>
+        </pc:spChg>
+        <pc:spChg chg="add mod">
+          <ac:chgData name="Robert Finch" userId="360118edfabb5ba6" providerId="LiveId" clId="{940D50E2-FEDC-434C-83CF-A13052851249}" dt="2025-12-04T09:18:39.432" v="867" actId="1076"/>
+          <ac:spMkLst>
+            <pc:docMk/>
+            <pc:sldMk cId="3910026719" sldId="269"/>
+            <ac:spMk id="5" creationId="{6765A915-9A5A-648D-F360-1AAD721CF2F6}"/>
+          </ac:spMkLst>
+        </pc:spChg>
+        <pc:spChg chg="add mod">
+          <ac:chgData name="Robert Finch" userId="360118edfabb5ba6" providerId="LiveId" clId="{940D50E2-FEDC-434C-83CF-A13052851249}" dt="2025-12-04T09:18:39.432" v="867" actId="1076"/>
+          <ac:spMkLst>
+            <pc:docMk/>
+            <pc:sldMk cId="3910026719" sldId="269"/>
+            <ac:spMk id="6" creationId="{C07255AE-BDB9-A748-7F0C-E97A1FBF0CC1}"/>
+          </ac:spMkLst>
+        </pc:spChg>
+        <pc:spChg chg="add mod">
+          <ac:chgData name="Robert Finch" userId="360118edfabb5ba6" providerId="LiveId" clId="{940D50E2-FEDC-434C-83CF-A13052851249}" dt="2025-12-04T09:18:39.432" v="867" actId="1076"/>
+          <ac:spMkLst>
+            <pc:docMk/>
+            <pc:sldMk cId="3910026719" sldId="269"/>
+            <ac:spMk id="7" creationId="{0DC0C240-5C0C-52AF-16E3-D08EEB75E984}"/>
+          </ac:spMkLst>
+        </pc:spChg>
+        <pc:spChg chg="add mod">
+          <ac:chgData name="Robert Finch" userId="360118edfabb5ba6" providerId="LiveId" clId="{940D50E2-FEDC-434C-83CF-A13052851249}" dt="2025-12-04T09:18:39.432" v="867" actId="1076"/>
+          <ac:spMkLst>
+            <pc:docMk/>
+            <pc:sldMk cId="3910026719" sldId="269"/>
+            <ac:spMk id="8" creationId="{BC9B011A-9BAC-FBE7-225E-1EB1F7CC3BE4}"/>
+          </ac:spMkLst>
+        </pc:spChg>
+        <pc:spChg chg="add mod">
+          <ac:chgData name="Robert Finch" userId="360118edfabb5ba6" providerId="LiveId" clId="{940D50E2-FEDC-434C-83CF-A13052851249}" dt="2025-12-04T09:18:39.432" v="867" actId="1076"/>
+          <ac:spMkLst>
+            <pc:docMk/>
+            <pc:sldMk cId="3910026719" sldId="269"/>
+            <ac:spMk id="9" creationId="{7E9615B4-C22D-1B51-18D2-958F358AECED}"/>
+          </ac:spMkLst>
+        </pc:spChg>
+        <pc:spChg chg="add mod">
+          <ac:chgData name="Robert Finch" userId="360118edfabb5ba6" providerId="LiveId" clId="{940D50E2-FEDC-434C-83CF-A13052851249}" dt="2025-12-04T09:18:39.432" v="867" actId="1076"/>
+          <ac:spMkLst>
+            <pc:docMk/>
+            <pc:sldMk cId="3910026719" sldId="269"/>
+            <ac:spMk id="10" creationId="{CA7F77DC-970B-D4D0-63B8-995288D337E6}"/>
+          </ac:spMkLst>
+        </pc:spChg>
+        <pc:spChg chg="add mod">
+          <ac:chgData name="Robert Finch" userId="360118edfabb5ba6" providerId="LiveId" clId="{940D50E2-FEDC-434C-83CF-A13052851249}" dt="2025-12-04T09:18:39.432" v="867" actId="1076"/>
+          <ac:spMkLst>
+            <pc:docMk/>
+            <pc:sldMk cId="3910026719" sldId="269"/>
+            <ac:spMk id="11" creationId="{9D740036-9D2E-E467-DCF1-251ECC6234C0}"/>
+          </ac:spMkLst>
+        </pc:spChg>
+        <pc:spChg chg="add mod">
+          <ac:chgData name="Robert Finch" userId="360118edfabb5ba6" providerId="LiveId" clId="{940D50E2-FEDC-434C-83CF-A13052851249}" dt="2025-12-04T09:18:39.432" v="867" actId="1076"/>
+          <ac:spMkLst>
+            <pc:docMk/>
+            <pc:sldMk cId="3910026719" sldId="269"/>
+            <ac:spMk id="12" creationId="{E5BCD9F3-A52B-993E-6537-E8F022C67E8D}"/>
+          </ac:spMkLst>
+        </pc:spChg>
+        <pc:spChg chg="add del">
+          <ac:chgData name="Robert Finch" userId="360118edfabb5ba6" providerId="LiveId" clId="{940D50E2-FEDC-434C-83CF-A13052851249}" dt="2025-12-04T09:16:56.847" v="665" actId="478"/>
+          <ac:spMkLst>
+            <pc:docMk/>
+            <pc:sldMk cId="3910026719" sldId="269"/>
+            <ac:spMk id="13" creationId="{35DE88DD-7629-7168-092C-5FBBEFC78965}"/>
+          </ac:spMkLst>
+        </pc:spChg>
+        <pc:spChg chg="add mod">
+          <ac:chgData name="Robert Finch" userId="360118edfabb5ba6" providerId="LiveId" clId="{940D50E2-FEDC-434C-83CF-A13052851249}" dt="2025-12-04T09:21:16.062" v="1078" actId="20577"/>
+          <ac:spMkLst>
+            <pc:docMk/>
+            <pc:sldMk cId="3910026719" sldId="269"/>
+            <ac:spMk id="14" creationId="{F6BA38B3-80F3-800E-D567-273A93B623F0}"/>
+          </ac:spMkLst>
+        </pc:spChg>
+        <pc:spChg chg="add del mod">
+          <ac:chgData name="Robert Finch" userId="360118edfabb5ba6" providerId="LiveId" clId="{940D50E2-FEDC-434C-83CF-A13052851249}" dt="2025-12-04T09:19:07.590" v="869" actId="478"/>
+          <ac:spMkLst>
+            <pc:docMk/>
+            <pc:sldMk cId="3910026719" sldId="269"/>
+            <ac:spMk id="15" creationId="{A8C8FE4E-89B9-C634-B5DB-9AE02160B0E7}"/>
+          </ac:spMkLst>
+        </pc:spChg>
+      </pc:sldChg>
     </pc:docChg>
   </pc:docChgLst>
 </pc:chgInfo>
@@ -405,7 +845,7 @@
           <a:p>
             <a:fld id="{40721942-3650-429E-A73C-F40215CD5967}" type="datetimeFigureOut">
               <a:rPr lang="en-CA" smtClean="0"/>
-              <a:t>2025-11-30</a:t>
+              <a:t>2025-12-03</a:t>
             </a:fld>
             <a:endParaRPr lang="en-CA"/>
           </a:p>
@@ -605,7 +1045,7 @@
           <a:p>
             <a:fld id="{40721942-3650-429E-A73C-F40215CD5967}" type="datetimeFigureOut">
               <a:rPr lang="en-CA" smtClean="0"/>
-              <a:t>2025-11-30</a:t>
+              <a:t>2025-12-03</a:t>
             </a:fld>
             <a:endParaRPr lang="en-CA"/>
           </a:p>
@@ -815,7 +1255,7 @@
           <a:p>
             <a:fld id="{40721942-3650-429E-A73C-F40215CD5967}" type="datetimeFigureOut">
               <a:rPr lang="en-CA" smtClean="0"/>
-              <a:t>2025-11-30</a:t>
+              <a:t>2025-12-03</a:t>
             </a:fld>
             <a:endParaRPr lang="en-CA"/>
           </a:p>
@@ -1015,7 +1455,7 @@
           <a:p>
             <a:fld id="{40721942-3650-429E-A73C-F40215CD5967}" type="datetimeFigureOut">
               <a:rPr lang="en-CA" smtClean="0"/>
-              <a:t>2025-11-30</a:t>
+              <a:t>2025-12-03</a:t>
             </a:fld>
             <a:endParaRPr lang="en-CA"/>
           </a:p>
@@ -1291,7 +1731,7 @@
           <a:p>
             <a:fld id="{40721942-3650-429E-A73C-F40215CD5967}" type="datetimeFigureOut">
               <a:rPr lang="en-CA" smtClean="0"/>
-              <a:t>2025-11-30</a:t>
+              <a:t>2025-12-03</a:t>
             </a:fld>
             <a:endParaRPr lang="en-CA"/>
           </a:p>
@@ -1559,7 +1999,7 @@
           <a:p>
             <a:fld id="{40721942-3650-429E-A73C-F40215CD5967}" type="datetimeFigureOut">
               <a:rPr lang="en-CA" smtClean="0"/>
-              <a:t>2025-11-30</a:t>
+              <a:t>2025-12-03</a:t>
             </a:fld>
             <a:endParaRPr lang="en-CA"/>
           </a:p>
@@ -1974,7 +2414,7 @@
           <a:p>
             <a:fld id="{40721942-3650-429E-A73C-F40215CD5967}" type="datetimeFigureOut">
               <a:rPr lang="en-CA" smtClean="0"/>
-              <a:t>2025-11-30</a:t>
+              <a:t>2025-12-03</a:t>
             </a:fld>
             <a:endParaRPr lang="en-CA"/>
           </a:p>
@@ -2116,7 +2556,7 @@
           <a:p>
             <a:fld id="{40721942-3650-429E-A73C-F40215CD5967}" type="datetimeFigureOut">
               <a:rPr lang="en-CA" smtClean="0"/>
-              <a:t>2025-11-30</a:t>
+              <a:t>2025-12-03</a:t>
             </a:fld>
             <a:endParaRPr lang="en-CA"/>
           </a:p>
@@ -2229,7 +2669,7 @@
           <a:p>
             <a:fld id="{40721942-3650-429E-A73C-F40215CD5967}" type="datetimeFigureOut">
               <a:rPr lang="en-CA" smtClean="0"/>
-              <a:t>2025-11-30</a:t>
+              <a:t>2025-12-03</a:t>
             </a:fld>
             <a:endParaRPr lang="en-CA"/>
           </a:p>
@@ -2542,7 +2982,7 @@
           <a:p>
             <a:fld id="{40721942-3650-429E-A73C-F40215CD5967}" type="datetimeFigureOut">
               <a:rPr lang="en-CA" smtClean="0"/>
-              <a:t>2025-11-30</a:t>
+              <a:t>2025-12-03</a:t>
             </a:fld>
             <a:endParaRPr lang="en-CA"/>
           </a:p>
@@ -2831,7 +3271,7 @@
           <a:p>
             <a:fld id="{40721942-3650-429E-A73C-F40215CD5967}" type="datetimeFigureOut">
               <a:rPr lang="en-CA" smtClean="0"/>
-              <a:t>2025-11-30</a:t>
+              <a:t>2025-12-03</a:t>
             </a:fld>
             <a:endParaRPr lang="en-CA"/>
           </a:p>
@@ -3074,7 +3514,7 @@
           <a:p>
             <a:fld id="{40721942-3650-429E-A73C-F40215CD5967}" type="datetimeFigureOut">
               <a:rPr lang="en-CA" smtClean="0"/>
-              <a:t>2025-11-30</a:t>
+              <a:t>2025-12-03</a:t>
             </a:fld>
             <a:endParaRPr lang="en-CA"/>
           </a:p>
@@ -6748,6 +7188,2783 @@
     <p:extLst>
       <p:ext uri="{BB962C8B-B14F-4D97-AF65-F5344CB8AC3E}">
         <p14:creationId xmlns:p14="http://schemas.microsoft.com/office/powerpoint/2010/main" val="3789913217"/>
+      </p:ext>
+    </p:extLst>
+  </p:cSld>
+  <p:clrMapOvr>
+    <a:masterClrMapping/>
+  </p:clrMapOvr>
+</p:sld>
+</file>
+
+<file path=ppt/slides/slide12.xml><?xml version="1.0" encoding="utf-8"?>
+<p:sld xmlns:a="http://schemas.openxmlformats.org/drawingml/2006/main" xmlns:r="http://schemas.openxmlformats.org/officeDocument/2006/relationships" xmlns:p="http://schemas.openxmlformats.org/presentationml/2006/main">
+  <p:cSld>
+    <p:spTree>
+      <p:nvGrpSpPr>
+        <p:cNvPr id="1" name=""/>
+        <p:cNvGrpSpPr/>
+        <p:nvPr/>
+      </p:nvGrpSpPr>
+      <p:grpSpPr>
+        <a:xfrm>
+          <a:off x="0" y="0"/>
+          <a:ext cx="0" cy="0"/>
+          <a:chOff x="0" y="0"/>
+          <a:chExt cx="0" cy="0"/>
+        </a:xfrm>
+      </p:grpSpPr>
+      <p:sp>
+        <p:nvSpPr>
+          <p:cNvPr id="2" name="Title 1">
+            <a:extLst>
+              <a:ext uri="{FF2B5EF4-FFF2-40B4-BE49-F238E27FC236}">
+                <a16:creationId xmlns:a16="http://schemas.microsoft.com/office/drawing/2014/main" id="{3050B25B-2706-8EB3-02AB-0A78B390E4B3}"/>
+              </a:ext>
+            </a:extLst>
+          </p:cNvPr>
+          <p:cNvSpPr>
+            <a:spLocks noGrp="1"/>
+          </p:cNvSpPr>
+          <p:nvPr>
+            <p:ph type="title"/>
+          </p:nvPr>
+        </p:nvSpPr>
+        <p:spPr>
+          <a:xfrm>
+            <a:off x="0" y="0"/>
+            <a:ext cx="10515600" cy="1325563"/>
+          </a:xfrm>
+        </p:spPr>
+        <p:txBody>
+          <a:bodyPr/>
+          <a:lstStyle/>
+          <a:p>
+            <a:r>
+              <a:rPr lang="en-US" dirty="0"/>
+              <a:t>Qupls4: Decoding Placement</a:t>
+            </a:r>
+            <a:endParaRPr lang="en-CA" dirty="0"/>
+          </a:p>
+        </p:txBody>
+      </p:sp>
+      <p:sp>
+        <p:nvSpPr>
+          <p:cNvPr id="4" name="Rectangle 3">
+            <a:extLst>
+              <a:ext uri="{FF2B5EF4-FFF2-40B4-BE49-F238E27FC236}">
+                <a16:creationId xmlns:a16="http://schemas.microsoft.com/office/drawing/2014/main" id="{F986A818-5AB2-A7B3-9AD5-B50500991B27}"/>
+              </a:ext>
+            </a:extLst>
+          </p:cNvPr>
+          <p:cNvSpPr/>
+          <p:nvPr/>
+        </p:nvSpPr>
+        <p:spPr>
+          <a:xfrm>
+            <a:off x="318052" y="1743690"/>
+            <a:ext cx="932484" cy="1914939"/>
+          </a:xfrm>
+          <a:prstGeom prst="rect">
+            <a:avLst/>
+          </a:prstGeom>
+        </p:spPr>
+        <p:style>
+          <a:lnRef idx="2">
+            <a:schemeClr val="accent1">
+              <a:shade val="15000"/>
+            </a:schemeClr>
+          </a:lnRef>
+          <a:fillRef idx="1">
+            <a:schemeClr val="accent1"/>
+          </a:fillRef>
+          <a:effectRef idx="0">
+            <a:schemeClr val="accent1"/>
+          </a:effectRef>
+          <a:fontRef idx="minor">
+            <a:schemeClr val="lt1"/>
+          </a:fontRef>
+        </p:style>
+        <p:txBody>
+          <a:bodyPr rtlCol="0" anchor="ctr"/>
+          <a:lstStyle/>
+          <a:p>
+            <a:pPr algn="ctr"/>
+            <a:r>
+              <a:rPr lang="en-US" sz="1200" dirty="0"/>
+              <a:t>Instruction Cache</a:t>
+            </a:r>
+            <a:endParaRPr lang="en-CA" sz="1200" dirty="0"/>
+          </a:p>
+        </p:txBody>
+      </p:sp>
+      <p:sp>
+        <p:nvSpPr>
+          <p:cNvPr id="5" name="Rectangle 4">
+            <a:extLst>
+              <a:ext uri="{FF2B5EF4-FFF2-40B4-BE49-F238E27FC236}">
+                <a16:creationId xmlns:a16="http://schemas.microsoft.com/office/drawing/2014/main" id="{FD67CC3A-4FBC-0F72-3350-2386E8D8A3DB}"/>
+              </a:ext>
+            </a:extLst>
+          </p:cNvPr>
+          <p:cNvSpPr/>
+          <p:nvPr/>
+        </p:nvSpPr>
+        <p:spPr>
+          <a:xfrm>
+            <a:off x="1630017" y="1743690"/>
+            <a:ext cx="932484" cy="1914939"/>
+          </a:xfrm>
+          <a:prstGeom prst="rect">
+            <a:avLst/>
+          </a:prstGeom>
+        </p:spPr>
+        <p:style>
+          <a:lnRef idx="2">
+            <a:schemeClr val="accent1">
+              <a:shade val="15000"/>
+            </a:schemeClr>
+          </a:lnRef>
+          <a:fillRef idx="1">
+            <a:schemeClr val="accent1"/>
+          </a:fillRef>
+          <a:effectRef idx="0">
+            <a:schemeClr val="accent1"/>
+          </a:effectRef>
+          <a:fontRef idx="minor">
+            <a:schemeClr val="lt1"/>
+          </a:fontRef>
+        </p:style>
+        <p:txBody>
+          <a:bodyPr rtlCol="0" anchor="ctr"/>
+          <a:lstStyle/>
+          <a:p>
+            <a:pPr algn="ctr"/>
+            <a:r>
+              <a:rPr lang="en-US" sz="1200" dirty="0"/>
+              <a:t>Instruction (ISA) Align and Extract</a:t>
+            </a:r>
+            <a:endParaRPr lang="en-CA" sz="1200" dirty="0"/>
+          </a:p>
+        </p:txBody>
+      </p:sp>
+      <p:sp>
+        <p:nvSpPr>
+          <p:cNvPr id="6" name="Rectangle 5">
+            <a:extLst>
+              <a:ext uri="{FF2B5EF4-FFF2-40B4-BE49-F238E27FC236}">
+                <a16:creationId xmlns:a16="http://schemas.microsoft.com/office/drawing/2014/main" id="{DC743D58-4896-F445-BD37-78B7612220A2}"/>
+              </a:ext>
+            </a:extLst>
+          </p:cNvPr>
+          <p:cNvSpPr/>
+          <p:nvPr/>
+        </p:nvSpPr>
+        <p:spPr>
+          <a:xfrm>
+            <a:off x="3000716" y="1743688"/>
+            <a:ext cx="932484" cy="1914939"/>
+          </a:xfrm>
+          <a:prstGeom prst="rect">
+            <a:avLst/>
+          </a:prstGeom>
+        </p:spPr>
+        <p:style>
+          <a:lnRef idx="2">
+            <a:schemeClr val="accent1">
+              <a:shade val="15000"/>
+            </a:schemeClr>
+          </a:lnRef>
+          <a:fillRef idx="1">
+            <a:schemeClr val="accent1"/>
+          </a:fillRef>
+          <a:effectRef idx="0">
+            <a:schemeClr val="accent1"/>
+          </a:effectRef>
+          <a:fontRef idx="minor">
+            <a:schemeClr val="lt1"/>
+          </a:fontRef>
+        </p:style>
+        <p:txBody>
+          <a:bodyPr rtlCol="0" anchor="ctr"/>
+          <a:lstStyle/>
+          <a:p>
+            <a:pPr algn="ctr"/>
+            <a:r>
+              <a:rPr lang="en-US" sz="1200" dirty="0"/>
+              <a:t>Instruction to Micro-op Translator</a:t>
+            </a:r>
+            <a:endParaRPr lang="en-CA" sz="1200" dirty="0"/>
+          </a:p>
+        </p:txBody>
+      </p:sp>
+      <p:sp>
+        <p:nvSpPr>
+          <p:cNvPr id="7" name="Rectangle 6">
+            <a:extLst>
+              <a:ext uri="{FF2B5EF4-FFF2-40B4-BE49-F238E27FC236}">
+                <a16:creationId xmlns:a16="http://schemas.microsoft.com/office/drawing/2014/main" id="{6F22FAFC-519B-CDE9-3A1A-0C2D12FEFDE7}"/>
+              </a:ext>
+            </a:extLst>
+          </p:cNvPr>
+          <p:cNvSpPr/>
+          <p:nvPr/>
+        </p:nvSpPr>
+        <p:spPr>
+          <a:xfrm>
+            <a:off x="4371415" y="1743687"/>
+            <a:ext cx="808383" cy="1914939"/>
+          </a:xfrm>
+          <a:prstGeom prst="rect">
+            <a:avLst/>
+          </a:prstGeom>
+        </p:spPr>
+        <p:style>
+          <a:lnRef idx="2">
+            <a:schemeClr val="accent1">
+              <a:shade val="15000"/>
+            </a:schemeClr>
+          </a:lnRef>
+          <a:fillRef idx="1">
+            <a:schemeClr val="accent1"/>
+          </a:fillRef>
+          <a:effectRef idx="0">
+            <a:schemeClr val="accent1"/>
+          </a:effectRef>
+          <a:fontRef idx="minor">
+            <a:schemeClr val="lt1"/>
+          </a:fontRef>
+        </p:style>
+        <p:txBody>
+          <a:bodyPr rtlCol="0" anchor="ctr"/>
+          <a:lstStyle/>
+          <a:p>
+            <a:pPr algn="ctr"/>
+            <a:r>
+              <a:rPr lang="en-US" sz="1200" dirty="0"/>
+              <a:t>Micro-op Decoder</a:t>
+            </a:r>
+            <a:endParaRPr lang="en-CA" sz="1200" dirty="0"/>
+          </a:p>
+        </p:txBody>
+      </p:sp>
+      <p:sp>
+        <p:nvSpPr>
+          <p:cNvPr id="8" name="Rectangle 7">
+            <a:extLst>
+              <a:ext uri="{FF2B5EF4-FFF2-40B4-BE49-F238E27FC236}">
+                <a16:creationId xmlns:a16="http://schemas.microsoft.com/office/drawing/2014/main" id="{C50FC78B-1F47-1554-32F3-B4790B90773E}"/>
+              </a:ext>
+            </a:extLst>
+          </p:cNvPr>
+          <p:cNvSpPr/>
+          <p:nvPr/>
+        </p:nvSpPr>
+        <p:spPr>
+          <a:xfrm>
+            <a:off x="5551148" y="1743686"/>
+            <a:ext cx="808383" cy="1914939"/>
+          </a:xfrm>
+          <a:prstGeom prst="rect">
+            <a:avLst/>
+          </a:prstGeom>
+        </p:spPr>
+        <p:style>
+          <a:lnRef idx="2">
+            <a:schemeClr val="accent1">
+              <a:shade val="15000"/>
+            </a:schemeClr>
+          </a:lnRef>
+          <a:fillRef idx="1">
+            <a:schemeClr val="accent1"/>
+          </a:fillRef>
+          <a:effectRef idx="0">
+            <a:schemeClr val="accent1"/>
+          </a:effectRef>
+          <a:fontRef idx="minor">
+            <a:schemeClr val="lt1"/>
+          </a:fontRef>
+        </p:style>
+        <p:txBody>
+          <a:bodyPr rtlCol="0" anchor="ctr"/>
+          <a:lstStyle/>
+          <a:p>
+            <a:pPr algn="ctr"/>
+            <a:r>
+              <a:rPr lang="en-US" sz="1200" dirty="0"/>
+              <a:t>Register Rename Stage</a:t>
+            </a:r>
+            <a:endParaRPr lang="en-CA" sz="1200" dirty="0"/>
+          </a:p>
+        </p:txBody>
+      </p:sp>
+      <p:sp>
+        <p:nvSpPr>
+          <p:cNvPr id="9" name="Rectangle 8">
+            <a:extLst>
+              <a:ext uri="{FF2B5EF4-FFF2-40B4-BE49-F238E27FC236}">
+                <a16:creationId xmlns:a16="http://schemas.microsoft.com/office/drawing/2014/main" id="{0C2F6C3F-EC1A-0305-A8BD-AFF525B3953A}"/>
+              </a:ext>
+            </a:extLst>
+          </p:cNvPr>
+          <p:cNvSpPr/>
+          <p:nvPr/>
+        </p:nvSpPr>
+        <p:spPr>
+          <a:xfrm>
+            <a:off x="6730881" y="1743685"/>
+            <a:ext cx="932484" cy="1914939"/>
+          </a:xfrm>
+          <a:prstGeom prst="rect">
+            <a:avLst/>
+          </a:prstGeom>
+        </p:spPr>
+        <p:style>
+          <a:lnRef idx="2">
+            <a:schemeClr val="accent1">
+              <a:shade val="15000"/>
+            </a:schemeClr>
+          </a:lnRef>
+          <a:fillRef idx="1">
+            <a:schemeClr val="accent1"/>
+          </a:fillRef>
+          <a:effectRef idx="0">
+            <a:schemeClr val="accent1"/>
+          </a:effectRef>
+          <a:fontRef idx="minor">
+            <a:schemeClr val="lt1"/>
+          </a:fontRef>
+        </p:style>
+        <p:txBody>
+          <a:bodyPr rtlCol="0" anchor="ctr"/>
+          <a:lstStyle/>
+          <a:p>
+            <a:pPr algn="ctr"/>
+            <a:r>
+              <a:rPr lang="en-US" sz="1200" dirty="0"/>
+              <a:t>Instruction Queue to Re-order Buffer</a:t>
+            </a:r>
+            <a:endParaRPr lang="en-CA" sz="1200" dirty="0"/>
+          </a:p>
+        </p:txBody>
+      </p:sp>
+      <p:sp>
+        <p:nvSpPr>
+          <p:cNvPr id="10" name="Rectangle 9">
+            <a:extLst>
+              <a:ext uri="{FF2B5EF4-FFF2-40B4-BE49-F238E27FC236}">
+                <a16:creationId xmlns:a16="http://schemas.microsoft.com/office/drawing/2014/main" id="{4D37097F-8AFF-23C8-015D-7086C5FE92ED}"/>
+              </a:ext>
+            </a:extLst>
+          </p:cNvPr>
+          <p:cNvSpPr/>
+          <p:nvPr/>
+        </p:nvSpPr>
+        <p:spPr>
+          <a:xfrm>
+            <a:off x="7910614" y="1743684"/>
+            <a:ext cx="1011996" cy="1914939"/>
+          </a:xfrm>
+          <a:prstGeom prst="rect">
+            <a:avLst/>
+          </a:prstGeom>
+        </p:spPr>
+        <p:style>
+          <a:lnRef idx="2">
+            <a:schemeClr val="accent1">
+              <a:shade val="15000"/>
+            </a:schemeClr>
+          </a:lnRef>
+          <a:fillRef idx="1">
+            <a:schemeClr val="accent1"/>
+          </a:fillRef>
+          <a:effectRef idx="0">
+            <a:schemeClr val="accent1"/>
+          </a:effectRef>
+          <a:fontRef idx="minor">
+            <a:schemeClr val="lt1"/>
+          </a:fontRef>
+        </p:style>
+        <p:txBody>
+          <a:bodyPr rtlCol="0" anchor="ctr"/>
+          <a:lstStyle/>
+          <a:p>
+            <a:pPr algn="ctr"/>
+            <a:r>
+              <a:rPr lang="en-US" sz="1200" dirty="0"/>
+              <a:t>Instruction Dispatcher</a:t>
+            </a:r>
+            <a:endParaRPr lang="en-CA" sz="1200" dirty="0"/>
+          </a:p>
+        </p:txBody>
+      </p:sp>
+      <p:sp>
+        <p:nvSpPr>
+          <p:cNvPr id="11" name="Rectangle 10">
+            <a:extLst>
+              <a:ext uri="{FF2B5EF4-FFF2-40B4-BE49-F238E27FC236}">
+                <a16:creationId xmlns:a16="http://schemas.microsoft.com/office/drawing/2014/main" id="{198D87D7-5214-4CCF-D911-C164BE726316}"/>
+              </a:ext>
+            </a:extLst>
+          </p:cNvPr>
+          <p:cNvSpPr/>
+          <p:nvPr/>
+        </p:nvSpPr>
+        <p:spPr>
+          <a:xfrm>
+            <a:off x="9169859" y="1743684"/>
+            <a:ext cx="1205948" cy="357809"/>
+          </a:xfrm>
+          <a:prstGeom prst="rect">
+            <a:avLst/>
+          </a:prstGeom>
+        </p:spPr>
+        <p:style>
+          <a:lnRef idx="2">
+            <a:schemeClr val="accent1">
+              <a:shade val="15000"/>
+            </a:schemeClr>
+          </a:lnRef>
+          <a:fillRef idx="1">
+            <a:schemeClr val="accent1"/>
+          </a:fillRef>
+          <a:effectRef idx="0">
+            <a:schemeClr val="accent1"/>
+          </a:effectRef>
+          <a:fontRef idx="minor">
+            <a:schemeClr val="lt1"/>
+          </a:fontRef>
+        </p:style>
+        <p:txBody>
+          <a:bodyPr rtlCol="0" anchor="ctr"/>
+          <a:lstStyle/>
+          <a:p>
+            <a:pPr algn="ctr"/>
+            <a:r>
+              <a:rPr lang="en-US" sz="1200" dirty="0"/>
+              <a:t>Reservation Stations</a:t>
+            </a:r>
+            <a:endParaRPr lang="en-CA" sz="1200" dirty="0"/>
+          </a:p>
+        </p:txBody>
+      </p:sp>
+      <p:sp>
+        <p:nvSpPr>
+          <p:cNvPr id="12" name="Rectangle 11">
+            <a:extLst>
+              <a:ext uri="{FF2B5EF4-FFF2-40B4-BE49-F238E27FC236}">
+                <a16:creationId xmlns:a16="http://schemas.microsoft.com/office/drawing/2014/main" id="{6D35E58A-D186-7F4C-F385-BB8058D5006A}"/>
+              </a:ext>
+            </a:extLst>
+          </p:cNvPr>
+          <p:cNvSpPr/>
+          <p:nvPr/>
+        </p:nvSpPr>
+        <p:spPr>
+          <a:xfrm>
+            <a:off x="9169859" y="2181006"/>
+            <a:ext cx="1205948" cy="357809"/>
+          </a:xfrm>
+          <a:prstGeom prst="rect">
+            <a:avLst/>
+          </a:prstGeom>
+        </p:spPr>
+        <p:style>
+          <a:lnRef idx="2">
+            <a:schemeClr val="accent1">
+              <a:shade val="15000"/>
+            </a:schemeClr>
+          </a:lnRef>
+          <a:fillRef idx="1">
+            <a:schemeClr val="accent1"/>
+          </a:fillRef>
+          <a:effectRef idx="0">
+            <a:schemeClr val="accent1"/>
+          </a:effectRef>
+          <a:fontRef idx="minor">
+            <a:schemeClr val="lt1"/>
+          </a:fontRef>
+        </p:style>
+        <p:txBody>
+          <a:bodyPr rtlCol="0" anchor="ctr"/>
+          <a:lstStyle/>
+          <a:p>
+            <a:pPr algn="ctr"/>
+            <a:r>
+              <a:rPr lang="en-US" sz="1200" dirty="0"/>
+              <a:t>Reservation Stations</a:t>
+            </a:r>
+            <a:endParaRPr lang="en-CA" sz="1200" dirty="0"/>
+          </a:p>
+        </p:txBody>
+      </p:sp>
+      <p:sp>
+        <p:nvSpPr>
+          <p:cNvPr id="13" name="Rectangle 12">
+            <a:extLst>
+              <a:ext uri="{FF2B5EF4-FFF2-40B4-BE49-F238E27FC236}">
+                <a16:creationId xmlns:a16="http://schemas.microsoft.com/office/drawing/2014/main" id="{12BB82C7-FF8B-4CC1-B399-7617E39E8291}"/>
+              </a:ext>
+            </a:extLst>
+          </p:cNvPr>
+          <p:cNvSpPr/>
+          <p:nvPr/>
+        </p:nvSpPr>
+        <p:spPr>
+          <a:xfrm>
+            <a:off x="9169859" y="2618328"/>
+            <a:ext cx="1205948" cy="357809"/>
+          </a:xfrm>
+          <a:prstGeom prst="rect">
+            <a:avLst/>
+          </a:prstGeom>
+        </p:spPr>
+        <p:style>
+          <a:lnRef idx="2">
+            <a:schemeClr val="accent1">
+              <a:shade val="15000"/>
+            </a:schemeClr>
+          </a:lnRef>
+          <a:fillRef idx="1">
+            <a:schemeClr val="accent1"/>
+          </a:fillRef>
+          <a:effectRef idx="0">
+            <a:schemeClr val="accent1"/>
+          </a:effectRef>
+          <a:fontRef idx="minor">
+            <a:schemeClr val="lt1"/>
+          </a:fontRef>
+        </p:style>
+        <p:txBody>
+          <a:bodyPr rtlCol="0" anchor="ctr"/>
+          <a:lstStyle/>
+          <a:p>
+            <a:pPr algn="ctr"/>
+            <a:r>
+              <a:rPr lang="en-US" sz="1200" dirty="0"/>
+              <a:t>Reservation Stations</a:t>
+            </a:r>
+            <a:endParaRPr lang="en-CA" sz="1200" dirty="0"/>
+          </a:p>
+        </p:txBody>
+      </p:sp>
+      <p:sp>
+        <p:nvSpPr>
+          <p:cNvPr id="14" name="Rectangle 13">
+            <a:extLst>
+              <a:ext uri="{FF2B5EF4-FFF2-40B4-BE49-F238E27FC236}">
+                <a16:creationId xmlns:a16="http://schemas.microsoft.com/office/drawing/2014/main" id="{3480C16B-509C-8C47-4F5B-BD33BBEC341C}"/>
+              </a:ext>
+            </a:extLst>
+          </p:cNvPr>
+          <p:cNvSpPr/>
+          <p:nvPr/>
+        </p:nvSpPr>
+        <p:spPr>
+          <a:xfrm>
+            <a:off x="9169859" y="3108673"/>
+            <a:ext cx="1205948" cy="357809"/>
+          </a:xfrm>
+          <a:prstGeom prst="rect">
+            <a:avLst/>
+          </a:prstGeom>
+        </p:spPr>
+        <p:style>
+          <a:lnRef idx="2">
+            <a:schemeClr val="accent1">
+              <a:shade val="15000"/>
+            </a:schemeClr>
+          </a:lnRef>
+          <a:fillRef idx="1">
+            <a:schemeClr val="accent1"/>
+          </a:fillRef>
+          <a:effectRef idx="0">
+            <a:schemeClr val="accent1"/>
+          </a:effectRef>
+          <a:fontRef idx="minor">
+            <a:schemeClr val="lt1"/>
+          </a:fontRef>
+        </p:style>
+        <p:txBody>
+          <a:bodyPr rtlCol="0" anchor="ctr"/>
+          <a:lstStyle/>
+          <a:p>
+            <a:pPr algn="ctr"/>
+            <a:r>
+              <a:rPr lang="en-US" sz="1200" dirty="0"/>
+              <a:t>Reservation Stations</a:t>
+            </a:r>
+            <a:endParaRPr lang="en-CA" sz="1200" dirty="0"/>
+          </a:p>
+        </p:txBody>
+      </p:sp>
+      <p:sp>
+        <p:nvSpPr>
+          <p:cNvPr id="15" name="Rectangle 14">
+            <a:extLst>
+              <a:ext uri="{FF2B5EF4-FFF2-40B4-BE49-F238E27FC236}">
+                <a16:creationId xmlns:a16="http://schemas.microsoft.com/office/drawing/2014/main" id="{526F122C-2B42-9A9B-F869-E7C10C736D74}"/>
+              </a:ext>
+            </a:extLst>
+          </p:cNvPr>
+          <p:cNvSpPr/>
+          <p:nvPr/>
+        </p:nvSpPr>
+        <p:spPr>
+          <a:xfrm>
+            <a:off x="10660143" y="1743683"/>
+            <a:ext cx="909576" cy="1914939"/>
+          </a:xfrm>
+          <a:prstGeom prst="rect">
+            <a:avLst/>
+          </a:prstGeom>
+        </p:spPr>
+        <p:style>
+          <a:lnRef idx="2">
+            <a:schemeClr val="accent1">
+              <a:shade val="15000"/>
+            </a:schemeClr>
+          </a:lnRef>
+          <a:fillRef idx="1">
+            <a:schemeClr val="accent1"/>
+          </a:fillRef>
+          <a:effectRef idx="0">
+            <a:schemeClr val="accent1"/>
+          </a:effectRef>
+          <a:fontRef idx="minor">
+            <a:schemeClr val="lt1"/>
+          </a:fontRef>
+        </p:style>
+        <p:txBody>
+          <a:bodyPr rtlCol="0" anchor="ctr"/>
+          <a:lstStyle/>
+          <a:p>
+            <a:pPr algn="ctr"/>
+            <a:r>
+              <a:rPr lang="en-US" sz="1200" dirty="0"/>
+              <a:t>Functional Units</a:t>
+            </a:r>
+            <a:endParaRPr lang="en-CA" sz="1200" dirty="0"/>
+          </a:p>
+        </p:txBody>
+      </p:sp>
+      <p:sp>
+        <p:nvSpPr>
+          <p:cNvPr id="16" name="Rectangle 15">
+            <a:extLst>
+              <a:ext uri="{FF2B5EF4-FFF2-40B4-BE49-F238E27FC236}">
+                <a16:creationId xmlns:a16="http://schemas.microsoft.com/office/drawing/2014/main" id="{2F909C33-040A-7EE5-16BB-8F7A9D2050AA}"/>
+              </a:ext>
+            </a:extLst>
+          </p:cNvPr>
+          <p:cNvSpPr/>
+          <p:nvPr/>
+        </p:nvSpPr>
+        <p:spPr>
+          <a:xfrm>
+            <a:off x="10708774" y="3022165"/>
+            <a:ext cx="812314" cy="636457"/>
+          </a:xfrm>
+          <a:prstGeom prst="rect">
+            <a:avLst/>
+          </a:prstGeom>
+        </p:spPr>
+        <p:style>
+          <a:lnRef idx="2">
+            <a:schemeClr val="accent1">
+              <a:shade val="15000"/>
+            </a:schemeClr>
+          </a:lnRef>
+          <a:fillRef idx="1">
+            <a:schemeClr val="accent1"/>
+          </a:fillRef>
+          <a:effectRef idx="0">
+            <a:schemeClr val="accent1"/>
+          </a:effectRef>
+          <a:fontRef idx="minor">
+            <a:schemeClr val="lt1"/>
+          </a:fontRef>
+        </p:style>
+        <p:txBody>
+          <a:bodyPr rtlCol="0" anchor="ctr"/>
+          <a:lstStyle/>
+          <a:p>
+            <a:pPr algn="ctr"/>
+            <a:r>
+              <a:rPr lang="en-US" sz="1200" dirty="0"/>
+              <a:t>Micro-op decode</a:t>
+            </a:r>
+            <a:endParaRPr lang="en-CA" sz="1200" dirty="0"/>
+          </a:p>
+        </p:txBody>
+      </p:sp>
+      <p:sp>
+        <p:nvSpPr>
+          <p:cNvPr id="17" name="Oval 16">
+            <a:extLst>
+              <a:ext uri="{FF2B5EF4-FFF2-40B4-BE49-F238E27FC236}">
+                <a16:creationId xmlns:a16="http://schemas.microsoft.com/office/drawing/2014/main" id="{4161D8EA-02BC-53C3-E9AA-F7B0A2CBBA15}"/>
+              </a:ext>
+            </a:extLst>
+          </p:cNvPr>
+          <p:cNvSpPr/>
+          <p:nvPr/>
+        </p:nvSpPr>
+        <p:spPr>
+          <a:xfrm>
+            <a:off x="10553495" y="2932889"/>
+            <a:ext cx="1099931" cy="815008"/>
+          </a:xfrm>
+          <a:prstGeom prst="ellipse">
+            <a:avLst/>
+          </a:prstGeom>
+          <a:noFill/>
+          <a:ln>
+            <a:solidFill>
+              <a:srgbClr val="C00000"/>
+            </a:solidFill>
+          </a:ln>
+        </p:spPr>
+        <p:style>
+          <a:lnRef idx="2">
+            <a:schemeClr val="accent1">
+              <a:shade val="15000"/>
+            </a:schemeClr>
+          </a:lnRef>
+          <a:fillRef idx="1">
+            <a:schemeClr val="accent1"/>
+          </a:fillRef>
+          <a:effectRef idx="0">
+            <a:schemeClr val="accent1"/>
+          </a:effectRef>
+          <a:fontRef idx="minor">
+            <a:schemeClr val="lt1"/>
+          </a:fontRef>
+        </p:style>
+        <p:txBody>
+          <a:bodyPr rtlCol="0" anchor="ctr"/>
+          <a:lstStyle/>
+          <a:p>
+            <a:pPr algn="ctr"/>
+            <a:endParaRPr lang="en-CA"/>
+          </a:p>
+        </p:txBody>
+      </p:sp>
+      <p:sp>
+        <p:nvSpPr>
+          <p:cNvPr id="18" name="Oval 17">
+            <a:extLst>
+              <a:ext uri="{FF2B5EF4-FFF2-40B4-BE49-F238E27FC236}">
+                <a16:creationId xmlns:a16="http://schemas.microsoft.com/office/drawing/2014/main" id="{92EC0335-84F6-6C7A-0E1D-12500B773CEA}"/>
+              </a:ext>
+            </a:extLst>
+          </p:cNvPr>
+          <p:cNvSpPr/>
+          <p:nvPr/>
+        </p:nvSpPr>
+        <p:spPr>
+          <a:xfrm>
+            <a:off x="4225640" y="2359910"/>
+            <a:ext cx="1099931" cy="815008"/>
+          </a:xfrm>
+          <a:prstGeom prst="ellipse">
+            <a:avLst/>
+          </a:prstGeom>
+          <a:noFill/>
+          <a:ln>
+            <a:solidFill>
+              <a:srgbClr val="C00000"/>
+            </a:solidFill>
+          </a:ln>
+        </p:spPr>
+        <p:style>
+          <a:lnRef idx="2">
+            <a:schemeClr val="accent1">
+              <a:shade val="15000"/>
+            </a:schemeClr>
+          </a:lnRef>
+          <a:fillRef idx="1">
+            <a:schemeClr val="accent1"/>
+          </a:fillRef>
+          <a:effectRef idx="0">
+            <a:schemeClr val="accent1"/>
+          </a:effectRef>
+          <a:fontRef idx="minor">
+            <a:schemeClr val="lt1"/>
+          </a:fontRef>
+        </p:style>
+        <p:txBody>
+          <a:bodyPr rtlCol="0" anchor="ctr"/>
+          <a:lstStyle/>
+          <a:p>
+            <a:pPr algn="ctr"/>
+            <a:endParaRPr lang="en-CA"/>
+          </a:p>
+        </p:txBody>
+      </p:sp>
+      <p:sp>
+        <p:nvSpPr>
+          <p:cNvPr id="19" name="TextBox 18">
+            <a:extLst>
+              <a:ext uri="{FF2B5EF4-FFF2-40B4-BE49-F238E27FC236}">
+                <a16:creationId xmlns:a16="http://schemas.microsoft.com/office/drawing/2014/main" id="{3684DD6F-A379-44E7-BC7B-D763C4617FE4}"/>
+              </a:ext>
+            </a:extLst>
+          </p:cNvPr>
+          <p:cNvSpPr txBox="1"/>
+          <p:nvPr/>
+        </p:nvSpPr>
+        <p:spPr>
+          <a:xfrm>
+            <a:off x="6060273" y="4155588"/>
+            <a:ext cx="1136850" cy="369332"/>
+          </a:xfrm>
+          <a:prstGeom prst="rect">
+            <a:avLst/>
+          </a:prstGeom>
+          <a:noFill/>
+        </p:spPr>
+        <p:txBody>
+          <a:bodyPr wrap="none" rtlCol="0">
+            <a:spAutoFit/>
+          </a:bodyPr>
+          <a:lstStyle/>
+          <a:p>
+            <a:r>
+              <a:rPr lang="en-US" dirty="0"/>
+              <a:t>Decoding</a:t>
+            </a:r>
+            <a:endParaRPr lang="en-CA" dirty="0"/>
+          </a:p>
+        </p:txBody>
+      </p:sp>
+      <p:cxnSp>
+        <p:nvCxnSpPr>
+          <p:cNvPr id="21" name="Straight Arrow Connector 20">
+            <a:extLst>
+              <a:ext uri="{FF2B5EF4-FFF2-40B4-BE49-F238E27FC236}">
+                <a16:creationId xmlns:a16="http://schemas.microsoft.com/office/drawing/2014/main" id="{6320FC7F-FFE0-5024-14C0-16F6373EAEBB}"/>
+              </a:ext>
+            </a:extLst>
+          </p:cNvPr>
+          <p:cNvCxnSpPr>
+            <a:stCxn id="4" idx="3"/>
+            <a:endCxn id="5" idx="1"/>
+          </p:cNvCxnSpPr>
+          <p:nvPr/>
+        </p:nvCxnSpPr>
+        <p:spPr>
+          <a:xfrm>
+            <a:off x="1250536" y="2701160"/>
+            <a:ext cx="379481" cy="0"/>
+          </a:xfrm>
+          <a:prstGeom prst="straightConnector1">
+            <a:avLst/>
+          </a:prstGeom>
+          <a:ln>
+            <a:tailEnd type="triangle"/>
+          </a:ln>
+        </p:spPr>
+        <p:style>
+          <a:lnRef idx="2">
+            <a:schemeClr val="accent1"/>
+          </a:lnRef>
+          <a:fillRef idx="0">
+            <a:schemeClr val="accent1"/>
+          </a:fillRef>
+          <a:effectRef idx="1">
+            <a:schemeClr val="accent1"/>
+          </a:effectRef>
+          <a:fontRef idx="minor">
+            <a:schemeClr val="tx1"/>
+          </a:fontRef>
+        </p:style>
+      </p:cxnSp>
+      <p:cxnSp>
+        <p:nvCxnSpPr>
+          <p:cNvPr id="23" name="Straight Arrow Connector 22">
+            <a:extLst>
+              <a:ext uri="{FF2B5EF4-FFF2-40B4-BE49-F238E27FC236}">
+                <a16:creationId xmlns:a16="http://schemas.microsoft.com/office/drawing/2014/main" id="{869BF54E-88AA-55C7-2ED9-B3A7524AFD41}"/>
+              </a:ext>
+            </a:extLst>
+          </p:cNvPr>
+          <p:cNvCxnSpPr>
+            <a:stCxn id="5" idx="3"/>
+            <a:endCxn id="6" idx="1"/>
+          </p:cNvCxnSpPr>
+          <p:nvPr/>
+        </p:nvCxnSpPr>
+        <p:spPr>
+          <a:xfrm flipV="1">
+            <a:off x="2562501" y="2701158"/>
+            <a:ext cx="438215" cy="2"/>
+          </a:xfrm>
+          <a:prstGeom prst="straightConnector1">
+            <a:avLst/>
+          </a:prstGeom>
+          <a:ln>
+            <a:tailEnd type="triangle"/>
+          </a:ln>
+        </p:spPr>
+        <p:style>
+          <a:lnRef idx="2">
+            <a:schemeClr val="accent1"/>
+          </a:lnRef>
+          <a:fillRef idx="0">
+            <a:schemeClr val="accent1"/>
+          </a:fillRef>
+          <a:effectRef idx="1">
+            <a:schemeClr val="accent1"/>
+          </a:effectRef>
+          <a:fontRef idx="minor">
+            <a:schemeClr val="tx1"/>
+          </a:fontRef>
+        </p:style>
+      </p:cxnSp>
+      <p:cxnSp>
+        <p:nvCxnSpPr>
+          <p:cNvPr id="25" name="Straight Arrow Connector 24">
+            <a:extLst>
+              <a:ext uri="{FF2B5EF4-FFF2-40B4-BE49-F238E27FC236}">
+                <a16:creationId xmlns:a16="http://schemas.microsoft.com/office/drawing/2014/main" id="{AD786A4B-5358-39A6-A057-ECFE46A8CE54}"/>
+              </a:ext>
+            </a:extLst>
+          </p:cNvPr>
+          <p:cNvCxnSpPr>
+            <a:stCxn id="6" idx="3"/>
+            <a:endCxn id="7" idx="1"/>
+          </p:cNvCxnSpPr>
+          <p:nvPr/>
+        </p:nvCxnSpPr>
+        <p:spPr>
+          <a:xfrm flipV="1">
+            <a:off x="3933200" y="2701157"/>
+            <a:ext cx="438215" cy="1"/>
+          </a:xfrm>
+          <a:prstGeom prst="straightConnector1">
+            <a:avLst/>
+          </a:prstGeom>
+          <a:ln>
+            <a:tailEnd type="triangle"/>
+          </a:ln>
+        </p:spPr>
+        <p:style>
+          <a:lnRef idx="2">
+            <a:schemeClr val="accent1"/>
+          </a:lnRef>
+          <a:fillRef idx="0">
+            <a:schemeClr val="accent1"/>
+          </a:fillRef>
+          <a:effectRef idx="1">
+            <a:schemeClr val="accent1"/>
+          </a:effectRef>
+          <a:fontRef idx="minor">
+            <a:schemeClr val="tx1"/>
+          </a:fontRef>
+        </p:style>
+      </p:cxnSp>
+      <p:cxnSp>
+        <p:nvCxnSpPr>
+          <p:cNvPr id="27" name="Straight Arrow Connector 26">
+            <a:extLst>
+              <a:ext uri="{FF2B5EF4-FFF2-40B4-BE49-F238E27FC236}">
+                <a16:creationId xmlns:a16="http://schemas.microsoft.com/office/drawing/2014/main" id="{10C91033-4BB2-E910-2101-054F7F2DB614}"/>
+              </a:ext>
+            </a:extLst>
+          </p:cNvPr>
+          <p:cNvCxnSpPr>
+            <a:stCxn id="7" idx="3"/>
+            <a:endCxn id="8" idx="1"/>
+          </p:cNvCxnSpPr>
+          <p:nvPr/>
+        </p:nvCxnSpPr>
+        <p:spPr>
+          <a:xfrm flipV="1">
+            <a:off x="5179798" y="2701156"/>
+            <a:ext cx="371350" cy="1"/>
+          </a:xfrm>
+          <a:prstGeom prst="straightConnector1">
+            <a:avLst/>
+          </a:prstGeom>
+          <a:ln>
+            <a:tailEnd type="triangle"/>
+          </a:ln>
+        </p:spPr>
+        <p:style>
+          <a:lnRef idx="2">
+            <a:schemeClr val="accent1"/>
+          </a:lnRef>
+          <a:fillRef idx="0">
+            <a:schemeClr val="accent1"/>
+          </a:fillRef>
+          <a:effectRef idx="1">
+            <a:schemeClr val="accent1"/>
+          </a:effectRef>
+          <a:fontRef idx="minor">
+            <a:schemeClr val="tx1"/>
+          </a:fontRef>
+        </p:style>
+      </p:cxnSp>
+      <p:cxnSp>
+        <p:nvCxnSpPr>
+          <p:cNvPr id="29" name="Straight Arrow Connector 28">
+            <a:extLst>
+              <a:ext uri="{FF2B5EF4-FFF2-40B4-BE49-F238E27FC236}">
+                <a16:creationId xmlns:a16="http://schemas.microsoft.com/office/drawing/2014/main" id="{7B964511-601F-90A7-48C2-DC3D4E6EA607}"/>
+              </a:ext>
+            </a:extLst>
+          </p:cNvPr>
+          <p:cNvCxnSpPr>
+            <a:stCxn id="8" idx="3"/>
+            <a:endCxn id="9" idx="1"/>
+          </p:cNvCxnSpPr>
+          <p:nvPr/>
+        </p:nvCxnSpPr>
+        <p:spPr>
+          <a:xfrm flipV="1">
+            <a:off x="6359531" y="2701155"/>
+            <a:ext cx="371350" cy="1"/>
+          </a:xfrm>
+          <a:prstGeom prst="straightConnector1">
+            <a:avLst/>
+          </a:prstGeom>
+          <a:ln>
+            <a:tailEnd type="triangle"/>
+          </a:ln>
+        </p:spPr>
+        <p:style>
+          <a:lnRef idx="2">
+            <a:schemeClr val="accent1"/>
+          </a:lnRef>
+          <a:fillRef idx="0">
+            <a:schemeClr val="accent1"/>
+          </a:fillRef>
+          <a:effectRef idx="1">
+            <a:schemeClr val="accent1"/>
+          </a:effectRef>
+          <a:fontRef idx="minor">
+            <a:schemeClr val="tx1"/>
+          </a:fontRef>
+        </p:style>
+      </p:cxnSp>
+      <p:cxnSp>
+        <p:nvCxnSpPr>
+          <p:cNvPr id="31" name="Straight Arrow Connector 30">
+            <a:extLst>
+              <a:ext uri="{FF2B5EF4-FFF2-40B4-BE49-F238E27FC236}">
+                <a16:creationId xmlns:a16="http://schemas.microsoft.com/office/drawing/2014/main" id="{7506FB71-2337-89CB-835B-EC15D2291E54}"/>
+              </a:ext>
+            </a:extLst>
+          </p:cNvPr>
+          <p:cNvCxnSpPr>
+            <a:stCxn id="9" idx="3"/>
+            <a:endCxn id="10" idx="1"/>
+          </p:cNvCxnSpPr>
+          <p:nvPr/>
+        </p:nvCxnSpPr>
+        <p:spPr>
+          <a:xfrm flipV="1">
+            <a:off x="7663365" y="2701154"/>
+            <a:ext cx="247249" cy="1"/>
+          </a:xfrm>
+          <a:prstGeom prst="straightConnector1">
+            <a:avLst/>
+          </a:prstGeom>
+          <a:ln>
+            <a:tailEnd type="triangle"/>
+          </a:ln>
+        </p:spPr>
+        <p:style>
+          <a:lnRef idx="2">
+            <a:schemeClr val="accent1"/>
+          </a:lnRef>
+          <a:fillRef idx="0">
+            <a:schemeClr val="accent1"/>
+          </a:fillRef>
+          <a:effectRef idx="1">
+            <a:schemeClr val="accent1"/>
+          </a:effectRef>
+          <a:fontRef idx="minor">
+            <a:schemeClr val="tx1"/>
+          </a:fontRef>
+        </p:style>
+      </p:cxnSp>
+      <p:cxnSp>
+        <p:nvCxnSpPr>
+          <p:cNvPr id="33" name="Straight Arrow Connector 32">
+            <a:extLst>
+              <a:ext uri="{FF2B5EF4-FFF2-40B4-BE49-F238E27FC236}">
+                <a16:creationId xmlns:a16="http://schemas.microsoft.com/office/drawing/2014/main" id="{1FABF2A9-5106-1EC2-FC6A-669CA5802D3D}"/>
+              </a:ext>
+            </a:extLst>
+          </p:cNvPr>
+          <p:cNvCxnSpPr>
+            <a:endCxn id="12" idx="1"/>
+          </p:cNvCxnSpPr>
+          <p:nvPr/>
+        </p:nvCxnSpPr>
+        <p:spPr>
+          <a:xfrm>
+            <a:off x="8922610" y="2359910"/>
+            <a:ext cx="247249" cy="1"/>
+          </a:xfrm>
+          <a:prstGeom prst="straightConnector1">
+            <a:avLst/>
+          </a:prstGeom>
+          <a:ln>
+            <a:tailEnd type="triangle"/>
+          </a:ln>
+        </p:spPr>
+        <p:style>
+          <a:lnRef idx="2">
+            <a:schemeClr val="accent1"/>
+          </a:lnRef>
+          <a:fillRef idx="0">
+            <a:schemeClr val="accent1"/>
+          </a:fillRef>
+          <a:effectRef idx="1">
+            <a:schemeClr val="accent1"/>
+          </a:effectRef>
+          <a:fontRef idx="minor">
+            <a:schemeClr val="tx1"/>
+          </a:fontRef>
+        </p:style>
+      </p:cxnSp>
+      <p:cxnSp>
+        <p:nvCxnSpPr>
+          <p:cNvPr id="35" name="Straight Arrow Connector 34">
+            <a:extLst>
+              <a:ext uri="{FF2B5EF4-FFF2-40B4-BE49-F238E27FC236}">
+                <a16:creationId xmlns:a16="http://schemas.microsoft.com/office/drawing/2014/main" id="{8BAAD784-FE55-0FB6-3124-959CF9453124}"/>
+              </a:ext>
+            </a:extLst>
+          </p:cNvPr>
+          <p:cNvCxnSpPr>
+            <a:endCxn id="11" idx="1"/>
+          </p:cNvCxnSpPr>
+          <p:nvPr/>
+        </p:nvCxnSpPr>
+        <p:spPr>
+          <a:xfrm>
+            <a:off x="8922610" y="1922588"/>
+            <a:ext cx="247249" cy="1"/>
+          </a:xfrm>
+          <a:prstGeom prst="straightConnector1">
+            <a:avLst/>
+          </a:prstGeom>
+          <a:ln>
+            <a:tailEnd type="triangle"/>
+          </a:ln>
+        </p:spPr>
+        <p:style>
+          <a:lnRef idx="2">
+            <a:schemeClr val="accent1"/>
+          </a:lnRef>
+          <a:fillRef idx="0">
+            <a:schemeClr val="accent1"/>
+          </a:fillRef>
+          <a:effectRef idx="1">
+            <a:schemeClr val="accent1"/>
+          </a:effectRef>
+          <a:fontRef idx="minor">
+            <a:schemeClr val="tx1"/>
+          </a:fontRef>
+        </p:style>
+      </p:cxnSp>
+      <p:cxnSp>
+        <p:nvCxnSpPr>
+          <p:cNvPr id="37" name="Straight Arrow Connector 36">
+            <a:extLst>
+              <a:ext uri="{FF2B5EF4-FFF2-40B4-BE49-F238E27FC236}">
+                <a16:creationId xmlns:a16="http://schemas.microsoft.com/office/drawing/2014/main" id="{E447E4B4-30D8-9E72-06DA-F9F6E108A9EB}"/>
+              </a:ext>
+            </a:extLst>
+          </p:cNvPr>
+          <p:cNvCxnSpPr>
+            <a:cxnSpLocks/>
+            <a:endCxn id="13" idx="1"/>
+          </p:cNvCxnSpPr>
+          <p:nvPr/>
+        </p:nvCxnSpPr>
+        <p:spPr>
+          <a:xfrm>
+            <a:off x="8922610" y="2797233"/>
+            <a:ext cx="247249" cy="0"/>
+          </a:xfrm>
+          <a:prstGeom prst="straightConnector1">
+            <a:avLst/>
+          </a:prstGeom>
+          <a:ln>
+            <a:tailEnd type="triangle"/>
+          </a:ln>
+        </p:spPr>
+        <p:style>
+          <a:lnRef idx="2">
+            <a:schemeClr val="accent1"/>
+          </a:lnRef>
+          <a:fillRef idx="0">
+            <a:schemeClr val="accent1"/>
+          </a:fillRef>
+          <a:effectRef idx="1">
+            <a:schemeClr val="accent1"/>
+          </a:effectRef>
+          <a:fontRef idx="minor">
+            <a:schemeClr val="tx1"/>
+          </a:fontRef>
+        </p:style>
+      </p:cxnSp>
+      <p:cxnSp>
+        <p:nvCxnSpPr>
+          <p:cNvPr id="40" name="Straight Arrow Connector 39">
+            <a:extLst>
+              <a:ext uri="{FF2B5EF4-FFF2-40B4-BE49-F238E27FC236}">
+                <a16:creationId xmlns:a16="http://schemas.microsoft.com/office/drawing/2014/main" id="{4369600B-BABA-FE32-1D1E-1B7FD4A12A14}"/>
+              </a:ext>
+            </a:extLst>
+          </p:cNvPr>
+          <p:cNvCxnSpPr>
+            <a:endCxn id="14" idx="1"/>
+          </p:cNvCxnSpPr>
+          <p:nvPr/>
+        </p:nvCxnSpPr>
+        <p:spPr>
+          <a:xfrm>
+            <a:off x="8922610" y="3287577"/>
+            <a:ext cx="247249" cy="1"/>
+          </a:xfrm>
+          <a:prstGeom prst="straightConnector1">
+            <a:avLst/>
+          </a:prstGeom>
+          <a:ln>
+            <a:tailEnd type="triangle"/>
+          </a:ln>
+        </p:spPr>
+        <p:style>
+          <a:lnRef idx="2">
+            <a:schemeClr val="accent1"/>
+          </a:lnRef>
+          <a:fillRef idx="0">
+            <a:schemeClr val="accent1"/>
+          </a:fillRef>
+          <a:effectRef idx="1">
+            <a:schemeClr val="accent1"/>
+          </a:effectRef>
+          <a:fontRef idx="minor">
+            <a:schemeClr val="tx1"/>
+          </a:fontRef>
+        </p:style>
+      </p:cxnSp>
+      <p:cxnSp>
+        <p:nvCxnSpPr>
+          <p:cNvPr id="42" name="Straight Arrow Connector 41">
+            <a:extLst>
+              <a:ext uri="{FF2B5EF4-FFF2-40B4-BE49-F238E27FC236}">
+                <a16:creationId xmlns:a16="http://schemas.microsoft.com/office/drawing/2014/main" id="{38DAB157-687B-FA64-ABF1-DECCC302E095}"/>
+              </a:ext>
+            </a:extLst>
+          </p:cNvPr>
+          <p:cNvCxnSpPr>
+            <a:stCxn id="11" idx="3"/>
+          </p:cNvCxnSpPr>
+          <p:nvPr/>
+        </p:nvCxnSpPr>
+        <p:spPr>
+          <a:xfrm flipV="1">
+            <a:off x="10375807" y="1922588"/>
+            <a:ext cx="232558" cy="1"/>
+          </a:xfrm>
+          <a:prstGeom prst="straightConnector1">
+            <a:avLst/>
+          </a:prstGeom>
+          <a:ln>
+            <a:tailEnd type="triangle"/>
+          </a:ln>
+        </p:spPr>
+        <p:style>
+          <a:lnRef idx="2">
+            <a:schemeClr val="accent1"/>
+          </a:lnRef>
+          <a:fillRef idx="0">
+            <a:schemeClr val="accent1"/>
+          </a:fillRef>
+          <a:effectRef idx="1">
+            <a:schemeClr val="accent1"/>
+          </a:effectRef>
+          <a:fontRef idx="minor">
+            <a:schemeClr val="tx1"/>
+          </a:fontRef>
+        </p:style>
+      </p:cxnSp>
+      <p:cxnSp>
+        <p:nvCxnSpPr>
+          <p:cNvPr id="44" name="Straight Arrow Connector 43">
+            <a:extLst>
+              <a:ext uri="{FF2B5EF4-FFF2-40B4-BE49-F238E27FC236}">
+                <a16:creationId xmlns:a16="http://schemas.microsoft.com/office/drawing/2014/main" id="{F596A18D-32F1-55FE-B292-C63A7CDDAAFF}"/>
+              </a:ext>
+            </a:extLst>
+          </p:cNvPr>
+          <p:cNvCxnSpPr>
+            <a:stCxn id="12" idx="3"/>
+          </p:cNvCxnSpPr>
+          <p:nvPr/>
+        </p:nvCxnSpPr>
+        <p:spPr>
+          <a:xfrm flipV="1">
+            <a:off x="10375807" y="2359910"/>
+            <a:ext cx="284336" cy="1"/>
+          </a:xfrm>
+          <a:prstGeom prst="straightConnector1">
+            <a:avLst/>
+          </a:prstGeom>
+          <a:ln>
+            <a:tailEnd type="triangle"/>
+          </a:ln>
+        </p:spPr>
+        <p:style>
+          <a:lnRef idx="2">
+            <a:schemeClr val="accent1"/>
+          </a:lnRef>
+          <a:fillRef idx="0">
+            <a:schemeClr val="accent1"/>
+          </a:fillRef>
+          <a:effectRef idx="1">
+            <a:schemeClr val="accent1"/>
+          </a:effectRef>
+          <a:fontRef idx="minor">
+            <a:schemeClr val="tx1"/>
+          </a:fontRef>
+        </p:style>
+      </p:cxnSp>
+      <p:cxnSp>
+        <p:nvCxnSpPr>
+          <p:cNvPr id="46" name="Straight Arrow Connector 45">
+            <a:extLst>
+              <a:ext uri="{FF2B5EF4-FFF2-40B4-BE49-F238E27FC236}">
+                <a16:creationId xmlns:a16="http://schemas.microsoft.com/office/drawing/2014/main" id="{2C833420-1047-3D23-BE0A-48A352A431B1}"/>
+              </a:ext>
+            </a:extLst>
+          </p:cNvPr>
+          <p:cNvCxnSpPr>
+            <a:stCxn id="13" idx="3"/>
+          </p:cNvCxnSpPr>
+          <p:nvPr/>
+        </p:nvCxnSpPr>
+        <p:spPr>
+          <a:xfrm flipV="1">
+            <a:off x="10375807" y="2797232"/>
+            <a:ext cx="232558" cy="1"/>
+          </a:xfrm>
+          <a:prstGeom prst="straightConnector1">
+            <a:avLst/>
+          </a:prstGeom>
+          <a:ln>
+            <a:tailEnd type="triangle"/>
+          </a:ln>
+        </p:spPr>
+        <p:style>
+          <a:lnRef idx="2">
+            <a:schemeClr val="accent1"/>
+          </a:lnRef>
+          <a:fillRef idx="0">
+            <a:schemeClr val="accent1"/>
+          </a:fillRef>
+          <a:effectRef idx="1">
+            <a:schemeClr val="accent1"/>
+          </a:effectRef>
+          <a:fontRef idx="minor">
+            <a:schemeClr val="tx1"/>
+          </a:fontRef>
+        </p:style>
+      </p:cxnSp>
+      <p:cxnSp>
+        <p:nvCxnSpPr>
+          <p:cNvPr id="48" name="Straight Arrow Connector 47">
+            <a:extLst>
+              <a:ext uri="{FF2B5EF4-FFF2-40B4-BE49-F238E27FC236}">
+                <a16:creationId xmlns:a16="http://schemas.microsoft.com/office/drawing/2014/main" id="{D4BC2AE6-1A92-0F7F-1056-54E42B947BFF}"/>
+              </a:ext>
+            </a:extLst>
+          </p:cNvPr>
+          <p:cNvCxnSpPr>
+            <a:stCxn id="14" idx="3"/>
+          </p:cNvCxnSpPr>
+          <p:nvPr/>
+        </p:nvCxnSpPr>
+        <p:spPr>
+          <a:xfrm flipV="1">
+            <a:off x="10375807" y="3287577"/>
+            <a:ext cx="284336" cy="1"/>
+          </a:xfrm>
+          <a:prstGeom prst="straightConnector1">
+            <a:avLst/>
+          </a:prstGeom>
+          <a:ln>
+            <a:tailEnd type="triangle"/>
+          </a:ln>
+        </p:spPr>
+        <p:style>
+          <a:lnRef idx="2">
+            <a:schemeClr val="accent1"/>
+          </a:lnRef>
+          <a:fillRef idx="0">
+            <a:schemeClr val="accent1"/>
+          </a:fillRef>
+          <a:effectRef idx="1">
+            <a:schemeClr val="accent1"/>
+          </a:effectRef>
+          <a:fontRef idx="minor">
+            <a:schemeClr val="tx1"/>
+          </a:fontRef>
+        </p:style>
+      </p:cxnSp>
+      <p:cxnSp>
+        <p:nvCxnSpPr>
+          <p:cNvPr id="50" name="Straight Arrow Connector 49">
+            <a:extLst>
+              <a:ext uri="{FF2B5EF4-FFF2-40B4-BE49-F238E27FC236}">
+                <a16:creationId xmlns:a16="http://schemas.microsoft.com/office/drawing/2014/main" id="{E3FE8526-AF2E-5DA2-36AF-D77B3DB40004}"/>
+              </a:ext>
+            </a:extLst>
+          </p:cNvPr>
+          <p:cNvCxnSpPr/>
+          <p:nvPr/>
+        </p:nvCxnSpPr>
+        <p:spPr>
+          <a:xfrm flipH="1" flipV="1">
+            <a:off x="5325571" y="3108673"/>
+            <a:ext cx="734702" cy="1046915"/>
+          </a:xfrm>
+          <a:prstGeom prst="straightConnector1">
+            <a:avLst/>
+          </a:prstGeom>
+          <a:ln>
+            <a:solidFill>
+              <a:srgbClr val="C00000"/>
+            </a:solidFill>
+            <a:tailEnd type="triangle"/>
+          </a:ln>
+        </p:spPr>
+        <p:style>
+          <a:lnRef idx="2">
+            <a:schemeClr val="accent1"/>
+          </a:lnRef>
+          <a:fillRef idx="0">
+            <a:schemeClr val="accent1"/>
+          </a:fillRef>
+          <a:effectRef idx="1">
+            <a:schemeClr val="accent1"/>
+          </a:effectRef>
+          <a:fontRef idx="minor">
+            <a:schemeClr val="tx1"/>
+          </a:fontRef>
+        </p:style>
+      </p:cxnSp>
+      <p:cxnSp>
+        <p:nvCxnSpPr>
+          <p:cNvPr id="52" name="Straight Arrow Connector 51">
+            <a:extLst>
+              <a:ext uri="{FF2B5EF4-FFF2-40B4-BE49-F238E27FC236}">
+                <a16:creationId xmlns:a16="http://schemas.microsoft.com/office/drawing/2014/main" id="{14FBF3B3-3CB4-E90E-723D-28BCCFAF5D51}"/>
+              </a:ext>
+            </a:extLst>
+          </p:cNvPr>
+          <p:cNvCxnSpPr/>
+          <p:nvPr/>
+        </p:nvCxnSpPr>
+        <p:spPr>
+          <a:xfrm flipV="1">
+            <a:off x="7268817" y="3632130"/>
+            <a:ext cx="3249158" cy="596344"/>
+          </a:xfrm>
+          <a:prstGeom prst="straightConnector1">
+            <a:avLst/>
+          </a:prstGeom>
+          <a:ln>
+            <a:solidFill>
+              <a:srgbClr val="C00000"/>
+            </a:solidFill>
+            <a:tailEnd type="triangle"/>
+          </a:ln>
+        </p:spPr>
+        <p:style>
+          <a:lnRef idx="2">
+            <a:schemeClr val="accent1"/>
+          </a:lnRef>
+          <a:fillRef idx="0">
+            <a:schemeClr val="accent1"/>
+          </a:fillRef>
+          <a:effectRef idx="1">
+            <a:schemeClr val="accent1"/>
+          </a:effectRef>
+          <a:fontRef idx="minor">
+            <a:schemeClr val="tx1"/>
+          </a:fontRef>
+        </p:style>
+      </p:cxnSp>
+      <p:sp>
+        <p:nvSpPr>
+          <p:cNvPr id="53" name="TextBox 52">
+            <a:extLst>
+              <a:ext uri="{FF2B5EF4-FFF2-40B4-BE49-F238E27FC236}">
+                <a16:creationId xmlns:a16="http://schemas.microsoft.com/office/drawing/2014/main" id="{C19E7C1D-A9AD-16AA-A100-257115DA4B9E}"/>
+              </a:ext>
+            </a:extLst>
+          </p:cNvPr>
+          <p:cNvSpPr txBox="1"/>
+          <p:nvPr/>
+        </p:nvSpPr>
+        <p:spPr>
+          <a:xfrm>
+            <a:off x="437322" y="1196690"/>
+            <a:ext cx="11324554" cy="307777"/>
+          </a:xfrm>
+          <a:prstGeom prst="rect">
+            <a:avLst/>
+          </a:prstGeom>
+          <a:noFill/>
+        </p:spPr>
+        <p:txBody>
+          <a:bodyPr wrap="square" rtlCol="0">
+            <a:spAutoFit/>
+          </a:bodyPr>
+          <a:lstStyle/>
+          <a:p>
+            <a:r>
+              <a:rPr lang="en-US" sz="1400" dirty="0"/>
+              <a:t>Most of the decode takes place in two places. Between micro-op translation and register rename, and in the functional units</a:t>
+            </a:r>
+            <a:endParaRPr lang="en-CA" sz="1400" dirty="0"/>
+          </a:p>
+        </p:txBody>
+      </p:sp>
+    </p:spTree>
+    <p:extLst>
+      <p:ext uri="{BB962C8B-B14F-4D97-AF65-F5344CB8AC3E}">
+        <p14:creationId xmlns:p14="http://schemas.microsoft.com/office/powerpoint/2010/main" val="2700656055"/>
+      </p:ext>
+    </p:extLst>
+  </p:cSld>
+  <p:clrMapOvr>
+    <a:masterClrMapping/>
+  </p:clrMapOvr>
+</p:sld>
+</file>
+
+<file path=ppt/slides/slide13.xml><?xml version="1.0" encoding="utf-8"?>
+<p:sld xmlns:a="http://schemas.openxmlformats.org/drawingml/2006/main" xmlns:r="http://schemas.openxmlformats.org/officeDocument/2006/relationships" xmlns:p="http://schemas.openxmlformats.org/presentationml/2006/main">
+  <p:cSld>
+    <p:spTree>
+      <p:nvGrpSpPr>
+        <p:cNvPr id="1" name="">
+          <a:extLst>
+            <a:ext uri="{FF2B5EF4-FFF2-40B4-BE49-F238E27FC236}">
+              <a16:creationId xmlns:a16="http://schemas.microsoft.com/office/drawing/2014/main" id="{DBFEAC9C-E86A-8F9F-ACE5-071E0AA281C8}"/>
+            </a:ext>
+          </a:extLst>
+        </p:cNvPr>
+        <p:cNvGrpSpPr/>
+        <p:nvPr/>
+      </p:nvGrpSpPr>
+      <p:grpSpPr>
+        <a:xfrm>
+          <a:off x="0" y="0"/>
+          <a:ext cx="0" cy="0"/>
+          <a:chOff x="0" y="0"/>
+          <a:chExt cx="0" cy="0"/>
+        </a:xfrm>
+      </p:grpSpPr>
+      <p:sp>
+        <p:nvSpPr>
+          <p:cNvPr id="2" name="Title 1">
+            <a:extLst>
+              <a:ext uri="{FF2B5EF4-FFF2-40B4-BE49-F238E27FC236}">
+                <a16:creationId xmlns:a16="http://schemas.microsoft.com/office/drawing/2014/main" id="{DE61D225-C030-A88E-9267-DF070E4D0FE1}"/>
+              </a:ext>
+            </a:extLst>
+          </p:cNvPr>
+          <p:cNvSpPr>
+            <a:spLocks noGrp="1"/>
+          </p:cNvSpPr>
+          <p:nvPr>
+            <p:ph type="title"/>
+          </p:nvPr>
+        </p:nvSpPr>
+        <p:spPr>
+          <a:xfrm>
+            <a:off x="0" y="18256"/>
+            <a:ext cx="10515600" cy="670858"/>
+          </a:xfrm>
+        </p:spPr>
+        <p:txBody>
+          <a:bodyPr>
+            <a:normAutofit fontScale="90000"/>
+          </a:bodyPr>
+          <a:lstStyle/>
+          <a:p>
+            <a:r>
+              <a:rPr lang="en-US" dirty="0"/>
+              <a:t>Qupls4: Data Cache</a:t>
+            </a:r>
+            <a:endParaRPr lang="en-CA" dirty="0"/>
+          </a:p>
+        </p:txBody>
+      </p:sp>
+      <p:sp>
+        <p:nvSpPr>
+          <p:cNvPr id="4" name="Rectangle 3">
+            <a:extLst>
+              <a:ext uri="{FF2B5EF4-FFF2-40B4-BE49-F238E27FC236}">
+                <a16:creationId xmlns:a16="http://schemas.microsoft.com/office/drawing/2014/main" id="{DB92907E-BEA9-76BC-AAEF-981BAB8A1957}"/>
+              </a:ext>
+            </a:extLst>
+          </p:cNvPr>
+          <p:cNvSpPr/>
+          <p:nvPr/>
+        </p:nvSpPr>
+        <p:spPr>
+          <a:xfrm>
+            <a:off x="3755139" y="1837367"/>
+            <a:ext cx="1484243" cy="2014330"/>
+          </a:xfrm>
+          <a:prstGeom prst="rect">
+            <a:avLst/>
+          </a:prstGeom>
+        </p:spPr>
+        <p:style>
+          <a:lnRef idx="2">
+            <a:schemeClr val="accent1">
+              <a:shade val="15000"/>
+            </a:schemeClr>
+          </a:lnRef>
+          <a:fillRef idx="1">
+            <a:schemeClr val="accent1"/>
+          </a:fillRef>
+          <a:effectRef idx="0">
+            <a:schemeClr val="accent1"/>
+          </a:effectRef>
+          <a:fontRef idx="minor">
+            <a:schemeClr val="lt1"/>
+          </a:fontRef>
+        </p:style>
+        <p:txBody>
+          <a:bodyPr rtlCol="0" anchor="ctr"/>
+          <a:lstStyle/>
+          <a:p>
+            <a:pPr algn="ctr"/>
+            <a:r>
+              <a:rPr lang="en-US" dirty="0"/>
+              <a:t>Cache RAM 512 x 512b x 4 way</a:t>
+            </a:r>
+            <a:endParaRPr lang="en-CA" dirty="0"/>
+          </a:p>
+        </p:txBody>
+      </p:sp>
+      <p:sp>
+        <p:nvSpPr>
+          <p:cNvPr id="5" name="Rectangle 4">
+            <a:extLst>
+              <a:ext uri="{FF2B5EF4-FFF2-40B4-BE49-F238E27FC236}">
+                <a16:creationId xmlns:a16="http://schemas.microsoft.com/office/drawing/2014/main" id="{C8397E5B-0220-706C-04AF-5389E8DC40C1}"/>
+              </a:ext>
+            </a:extLst>
+          </p:cNvPr>
+          <p:cNvSpPr/>
+          <p:nvPr/>
+        </p:nvSpPr>
+        <p:spPr>
+          <a:xfrm>
+            <a:off x="3755139" y="4030601"/>
+            <a:ext cx="1484243" cy="974035"/>
+          </a:xfrm>
+          <a:prstGeom prst="rect">
+            <a:avLst/>
+          </a:prstGeom>
+        </p:spPr>
+        <p:style>
+          <a:lnRef idx="2">
+            <a:schemeClr val="accent1">
+              <a:shade val="15000"/>
+            </a:schemeClr>
+          </a:lnRef>
+          <a:fillRef idx="1">
+            <a:schemeClr val="accent1"/>
+          </a:fillRef>
+          <a:effectRef idx="0">
+            <a:schemeClr val="accent1"/>
+          </a:effectRef>
+          <a:fontRef idx="minor">
+            <a:schemeClr val="lt1"/>
+          </a:fontRef>
+        </p:style>
+        <p:txBody>
+          <a:bodyPr rtlCol="0" anchor="ctr"/>
+          <a:lstStyle/>
+          <a:p>
+            <a:pPr algn="ctr"/>
+            <a:r>
+              <a:rPr lang="en-US" dirty="0"/>
+              <a:t>Tag RAM</a:t>
+            </a:r>
+          </a:p>
+          <a:p>
+            <a:pPr algn="ctr"/>
+            <a:r>
+              <a:rPr lang="en-US" dirty="0"/>
+              <a:t> 512 x 48b x 4 way</a:t>
+            </a:r>
+            <a:endParaRPr lang="en-CA" dirty="0"/>
+          </a:p>
+        </p:txBody>
+      </p:sp>
+      <p:sp>
+        <p:nvSpPr>
+          <p:cNvPr id="6" name="Rectangle 5">
+            <a:extLst>
+              <a:ext uri="{FF2B5EF4-FFF2-40B4-BE49-F238E27FC236}">
+                <a16:creationId xmlns:a16="http://schemas.microsoft.com/office/drawing/2014/main" id="{BF664806-29AA-37C1-DFB8-FEC6C89CCF2D}"/>
+              </a:ext>
+            </a:extLst>
+          </p:cNvPr>
+          <p:cNvSpPr/>
+          <p:nvPr/>
+        </p:nvSpPr>
+        <p:spPr>
+          <a:xfrm>
+            <a:off x="1893209" y="1845366"/>
+            <a:ext cx="1265583" cy="3167268"/>
+          </a:xfrm>
+          <a:prstGeom prst="rect">
+            <a:avLst/>
+          </a:prstGeom>
+        </p:spPr>
+        <p:style>
+          <a:lnRef idx="2">
+            <a:schemeClr val="accent1">
+              <a:shade val="15000"/>
+            </a:schemeClr>
+          </a:lnRef>
+          <a:fillRef idx="1">
+            <a:schemeClr val="accent1"/>
+          </a:fillRef>
+          <a:effectRef idx="0">
+            <a:schemeClr val="accent1"/>
+          </a:effectRef>
+          <a:fontRef idx="minor">
+            <a:schemeClr val="lt1"/>
+          </a:fontRef>
+        </p:style>
+        <p:txBody>
+          <a:bodyPr rtlCol="0" anchor="ctr"/>
+          <a:lstStyle/>
+          <a:p>
+            <a:pPr algn="ctr"/>
+            <a:r>
+              <a:rPr lang="en-US" dirty="0"/>
+              <a:t>Cache Controller</a:t>
+            </a:r>
+            <a:endParaRPr lang="en-CA" dirty="0"/>
+          </a:p>
+        </p:txBody>
+      </p:sp>
+      <p:sp>
+        <p:nvSpPr>
+          <p:cNvPr id="7" name="Arrow: Right 6">
+            <a:extLst>
+              <a:ext uri="{FF2B5EF4-FFF2-40B4-BE49-F238E27FC236}">
+                <a16:creationId xmlns:a16="http://schemas.microsoft.com/office/drawing/2014/main" id="{29E98186-9016-EFE7-5230-E42597D25EB5}"/>
+              </a:ext>
+            </a:extLst>
+          </p:cNvPr>
+          <p:cNvSpPr/>
+          <p:nvPr/>
+        </p:nvSpPr>
+        <p:spPr>
+          <a:xfrm>
+            <a:off x="3158792" y="2627242"/>
+            <a:ext cx="596347" cy="569843"/>
+          </a:xfrm>
+          <a:prstGeom prst="rightArrow">
+            <a:avLst/>
+          </a:prstGeom>
+        </p:spPr>
+        <p:style>
+          <a:lnRef idx="2">
+            <a:schemeClr val="accent1">
+              <a:shade val="15000"/>
+            </a:schemeClr>
+          </a:lnRef>
+          <a:fillRef idx="1">
+            <a:schemeClr val="accent1"/>
+          </a:fillRef>
+          <a:effectRef idx="0">
+            <a:schemeClr val="accent1"/>
+          </a:effectRef>
+          <a:fontRef idx="minor">
+            <a:schemeClr val="lt1"/>
+          </a:fontRef>
+        </p:style>
+        <p:txBody>
+          <a:bodyPr rtlCol="0" anchor="ctr"/>
+          <a:lstStyle/>
+          <a:p>
+            <a:pPr algn="ctr"/>
+            <a:endParaRPr lang="en-CA"/>
+          </a:p>
+        </p:txBody>
+      </p:sp>
+      <p:sp>
+        <p:nvSpPr>
+          <p:cNvPr id="8" name="Arrow: Up-Down 7">
+            <a:extLst>
+              <a:ext uri="{FF2B5EF4-FFF2-40B4-BE49-F238E27FC236}">
+                <a16:creationId xmlns:a16="http://schemas.microsoft.com/office/drawing/2014/main" id="{F2F6CF7F-578C-D677-CECB-00C91CBB6B8E}"/>
+              </a:ext>
+            </a:extLst>
+          </p:cNvPr>
+          <p:cNvSpPr/>
+          <p:nvPr/>
+        </p:nvSpPr>
+        <p:spPr>
+          <a:xfrm rot="16200000">
+            <a:off x="3261497" y="4219444"/>
+            <a:ext cx="390939" cy="596348"/>
+          </a:xfrm>
+          <a:prstGeom prst="upDownArrow">
+            <a:avLst/>
+          </a:prstGeom>
+        </p:spPr>
+        <p:style>
+          <a:lnRef idx="2">
+            <a:schemeClr val="accent1">
+              <a:shade val="15000"/>
+            </a:schemeClr>
+          </a:lnRef>
+          <a:fillRef idx="1">
+            <a:schemeClr val="accent1"/>
+          </a:fillRef>
+          <a:effectRef idx="0">
+            <a:schemeClr val="accent1"/>
+          </a:effectRef>
+          <a:fontRef idx="minor">
+            <a:schemeClr val="lt1"/>
+          </a:fontRef>
+        </p:style>
+        <p:txBody>
+          <a:bodyPr rtlCol="0" anchor="ctr"/>
+          <a:lstStyle/>
+          <a:p>
+            <a:pPr algn="ctr"/>
+            <a:endParaRPr lang="en-CA"/>
+          </a:p>
+        </p:txBody>
+      </p:sp>
+      <p:sp>
+        <p:nvSpPr>
+          <p:cNvPr id="9" name="Rectangle 8">
+            <a:extLst>
+              <a:ext uri="{FF2B5EF4-FFF2-40B4-BE49-F238E27FC236}">
+                <a16:creationId xmlns:a16="http://schemas.microsoft.com/office/drawing/2014/main" id="{3350B7B3-A68D-E818-7BD2-AC6FD65EE3F8}"/>
+              </a:ext>
+            </a:extLst>
+          </p:cNvPr>
+          <p:cNvSpPr/>
+          <p:nvPr/>
+        </p:nvSpPr>
+        <p:spPr>
+          <a:xfrm>
+            <a:off x="382462" y="1837367"/>
+            <a:ext cx="914400" cy="3167268"/>
+          </a:xfrm>
+          <a:prstGeom prst="rect">
+            <a:avLst/>
+          </a:prstGeom>
+        </p:spPr>
+        <p:style>
+          <a:lnRef idx="2">
+            <a:schemeClr val="accent1">
+              <a:shade val="15000"/>
+            </a:schemeClr>
+          </a:lnRef>
+          <a:fillRef idx="1">
+            <a:schemeClr val="accent1"/>
+          </a:fillRef>
+          <a:effectRef idx="0">
+            <a:schemeClr val="accent1"/>
+          </a:effectRef>
+          <a:fontRef idx="minor">
+            <a:schemeClr val="lt1"/>
+          </a:fontRef>
+        </p:style>
+        <p:txBody>
+          <a:bodyPr rtlCol="0" anchor="ctr"/>
+          <a:lstStyle/>
+          <a:p>
+            <a:pPr algn="ctr"/>
+            <a:r>
+              <a:rPr lang="en-US" dirty="0"/>
+              <a:t>System Bus</a:t>
+            </a:r>
+          </a:p>
+          <a:p>
+            <a:pPr algn="ctr"/>
+            <a:r>
+              <a:rPr lang="en-US" dirty="0"/>
+              <a:t>256b wide</a:t>
+            </a:r>
+            <a:endParaRPr lang="en-CA" dirty="0"/>
+          </a:p>
+        </p:txBody>
+      </p:sp>
+      <p:sp>
+        <p:nvSpPr>
+          <p:cNvPr id="10" name="Arrow: Right 9">
+            <a:extLst>
+              <a:ext uri="{FF2B5EF4-FFF2-40B4-BE49-F238E27FC236}">
+                <a16:creationId xmlns:a16="http://schemas.microsoft.com/office/drawing/2014/main" id="{557A823A-C254-0155-6A70-CAA7466F160D}"/>
+              </a:ext>
+            </a:extLst>
+          </p:cNvPr>
+          <p:cNvSpPr/>
+          <p:nvPr/>
+        </p:nvSpPr>
+        <p:spPr>
+          <a:xfrm>
+            <a:off x="1296862" y="3144078"/>
+            <a:ext cx="596347" cy="569843"/>
+          </a:xfrm>
+          <a:prstGeom prst="rightArrow">
+            <a:avLst/>
+          </a:prstGeom>
+        </p:spPr>
+        <p:style>
+          <a:lnRef idx="2">
+            <a:schemeClr val="accent1">
+              <a:shade val="15000"/>
+            </a:schemeClr>
+          </a:lnRef>
+          <a:fillRef idx="1">
+            <a:schemeClr val="accent1"/>
+          </a:fillRef>
+          <a:effectRef idx="0">
+            <a:schemeClr val="accent1"/>
+          </a:effectRef>
+          <a:fontRef idx="minor">
+            <a:schemeClr val="lt1"/>
+          </a:fontRef>
+        </p:style>
+        <p:txBody>
+          <a:bodyPr rtlCol="0" anchor="ctr"/>
+          <a:lstStyle/>
+          <a:p>
+            <a:pPr algn="ctr"/>
+            <a:endParaRPr lang="en-CA"/>
+          </a:p>
+        </p:txBody>
+      </p:sp>
+      <p:sp>
+        <p:nvSpPr>
+          <p:cNvPr id="11" name="Rectangle 10">
+            <a:extLst>
+              <a:ext uri="{FF2B5EF4-FFF2-40B4-BE49-F238E27FC236}">
+                <a16:creationId xmlns:a16="http://schemas.microsoft.com/office/drawing/2014/main" id="{570916D4-3B5F-50EB-56B8-2FE1550D08A8}"/>
+              </a:ext>
+            </a:extLst>
+          </p:cNvPr>
+          <p:cNvSpPr/>
+          <p:nvPr/>
+        </p:nvSpPr>
+        <p:spPr>
+          <a:xfrm>
+            <a:off x="5835729" y="1845366"/>
+            <a:ext cx="914400" cy="3167268"/>
+          </a:xfrm>
+          <a:prstGeom prst="rect">
+            <a:avLst/>
+          </a:prstGeom>
+        </p:spPr>
+        <p:style>
+          <a:lnRef idx="2">
+            <a:schemeClr val="accent1">
+              <a:shade val="15000"/>
+            </a:schemeClr>
+          </a:lnRef>
+          <a:fillRef idx="1">
+            <a:schemeClr val="accent1"/>
+          </a:fillRef>
+          <a:effectRef idx="0">
+            <a:schemeClr val="accent1"/>
+          </a:effectRef>
+          <a:fontRef idx="minor">
+            <a:schemeClr val="lt1"/>
+          </a:fontRef>
+        </p:style>
+        <p:txBody>
+          <a:bodyPr rtlCol="0" anchor="ctr"/>
+          <a:lstStyle/>
+          <a:p>
+            <a:pPr algn="ctr"/>
+            <a:r>
+              <a:rPr lang="en-US" dirty="0"/>
+              <a:t>Data Aligner</a:t>
+            </a:r>
+            <a:endParaRPr lang="en-CA" dirty="0"/>
+          </a:p>
+        </p:txBody>
+      </p:sp>
+      <p:sp>
+        <p:nvSpPr>
+          <p:cNvPr id="24" name="TextBox 23">
+            <a:extLst>
+              <a:ext uri="{FF2B5EF4-FFF2-40B4-BE49-F238E27FC236}">
+                <a16:creationId xmlns:a16="http://schemas.microsoft.com/office/drawing/2014/main" id="{15677DDD-B737-F274-CC06-D42BA496A9C0}"/>
+              </a:ext>
+            </a:extLst>
+          </p:cNvPr>
+          <p:cNvSpPr txBox="1"/>
+          <p:nvPr/>
+        </p:nvSpPr>
+        <p:spPr>
+          <a:xfrm>
+            <a:off x="272025" y="816113"/>
+            <a:ext cx="11114156" cy="707886"/>
+          </a:xfrm>
+          <a:prstGeom prst="rect">
+            <a:avLst/>
+          </a:prstGeom>
+          <a:noFill/>
+        </p:spPr>
+        <p:txBody>
+          <a:bodyPr wrap="square" rtlCol="0">
+            <a:spAutoFit/>
+          </a:bodyPr>
+          <a:lstStyle/>
+          <a:p>
+            <a:r>
+              <a:rPr lang="en-US" sz="1000" dirty="0"/>
+              <a:t>Two 256b bus cycles are run by the cache controller to full-fill a 512b cache miss request.</a:t>
+            </a:r>
+          </a:p>
+          <a:p>
+            <a:endParaRPr lang="en-US" sz="1000" dirty="0"/>
+          </a:p>
+          <a:p>
+            <a:r>
+              <a:rPr lang="en-US" sz="1000" dirty="0"/>
+              <a:t>The data aligner shifts the data into or from the proper position on the cache line.</a:t>
+            </a:r>
+          </a:p>
+          <a:p>
+            <a:endParaRPr lang="en-US" sz="1000" dirty="0"/>
+          </a:p>
+        </p:txBody>
+      </p:sp>
+      <p:sp>
+        <p:nvSpPr>
+          <p:cNvPr id="3" name="Arrow: Up-Down 2">
+            <a:extLst>
+              <a:ext uri="{FF2B5EF4-FFF2-40B4-BE49-F238E27FC236}">
+                <a16:creationId xmlns:a16="http://schemas.microsoft.com/office/drawing/2014/main" id="{F320515B-C048-B3B0-DDFF-449B7E54EF0D}"/>
+              </a:ext>
+            </a:extLst>
+          </p:cNvPr>
+          <p:cNvSpPr/>
+          <p:nvPr/>
+        </p:nvSpPr>
+        <p:spPr>
+          <a:xfrm rot="16200000">
+            <a:off x="5313659" y="2637928"/>
+            <a:ext cx="484632" cy="596349"/>
+          </a:xfrm>
+          <a:prstGeom prst="upDownArrow">
+            <a:avLst/>
+          </a:prstGeom>
+        </p:spPr>
+        <p:style>
+          <a:lnRef idx="2">
+            <a:schemeClr val="accent1">
+              <a:shade val="15000"/>
+            </a:schemeClr>
+          </a:lnRef>
+          <a:fillRef idx="1">
+            <a:schemeClr val="accent1"/>
+          </a:fillRef>
+          <a:effectRef idx="0">
+            <a:schemeClr val="accent1"/>
+          </a:effectRef>
+          <a:fontRef idx="minor">
+            <a:schemeClr val="lt1"/>
+          </a:fontRef>
+        </p:style>
+        <p:txBody>
+          <a:bodyPr rtlCol="0" anchor="ctr"/>
+          <a:lstStyle/>
+          <a:p>
+            <a:pPr algn="ctr"/>
+            <a:endParaRPr lang="en-CA"/>
+          </a:p>
+        </p:txBody>
+      </p:sp>
+      <p:sp>
+        <p:nvSpPr>
+          <p:cNvPr id="25" name="Arrow: Up-Down 24">
+            <a:extLst>
+              <a:ext uri="{FF2B5EF4-FFF2-40B4-BE49-F238E27FC236}">
+                <a16:creationId xmlns:a16="http://schemas.microsoft.com/office/drawing/2014/main" id="{184A65E6-B0FD-E3EA-4E21-168236F88CA3}"/>
+              </a:ext>
+            </a:extLst>
+          </p:cNvPr>
+          <p:cNvSpPr/>
+          <p:nvPr/>
+        </p:nvSpPr>
+        <p:spPr>
+          <a:xfrm rot="16200000">
+            <a:off x="6995914" y="2725387"/>
+            <a:ext cx="954773" cy="1446343"/>
+          </a:xfrm>
+          <a:prstGeom prst="upDownArrow">
+            <a:avLst/>
+          </a:prstGeom>
+        </p:spPr>
+        <p:style>
+          <a:lnRef idx="2">
+            <a:schemeClr val="accent1">
+              <a:shade val="15000"/>
+            </a:schemeClr>
+          </a:lnRef>
+          <a:fillRef idx="1">
+            <a:schemeClr val="accent1"/>
+          </a:fillRef>
+          <a:effectRef idx="0">
+            <a:schemeClr val="accent1"/>
+          </a:effectRef>
+          <a:fontRef idx="minor">
+            <a:schemeClr val="lt1"/>
+          </a:fontRef>
+        </p:style>
+        <p:txBody>
+          <a:bodyPr rtlCol="0" anchor="ctr"/>
+          <a:lstStyle/>
+          <a:p>
+            <a:pPr algn="ctr"/>
+            <a:endParaRPr lang="en-CA"/>
+          </a:p>
+        </p:txBody>
+      </p:sp>
+      <p:sp>
+        <p:nvSpPr>
+          <p:cNvPr id="26" name="TextBox 25">
+            <a:extLst>
+              <a:ext uri="{FF2B5EF4-FFF2-40B4-BE49-F238E27FC236}">
+                <a16:creationId xmlns:a16="http://schemas.microsoft.com/office/drawing/2014/main" id="{9A0E7198-4FB0-5949-B7AA-D94862E804D7}"/>
+              </a:ext>
+            </a:extLst>
+          </p:cNvPr>
+          <p:cNvSpPr txBox="1"/>
+          <p:nvPr/>
+        </p:nvSpPr>
+        <p:spPr>
+          <a:xfrm>
+            <a:off x="7021458" y="2509120"/>
+            <a:ext cx="1789721" cy="369332"/>
+          </a:xfrm>
+          <a:prstGeom prst="rect">
+            <a:avLst/>
+          </a:prstGeom>
+          <a:noFill/>
+        </p:spPr>
+        <p:txBody>
+          <a:bodyPr wrap="none" rtlCol="0">
+            <a:spAutoFit/>
+          </a:bodyPr>
+          <a:lstStyle/>
+          <a:p>
+            <a:r>
+              <a:rPr lang="en-US" dirty="0"/>
+              <a:t>Up to 512b Data</a:t>
+            </a:r>
+            <a:endParaRPr lang="en-CA" dirty="0"/>
+          </a:p>
+        </p:txBody>
+      </p:sp>
+    </p:spTree>
+    <p:extLst>
+      <p:ext uri="{BB962C8B-B14F-4D97-AF65-F5344CB8AC3E}">
+        <p14:creationId xmlns:p14="http://schemas.microsoft.com/office/powerpoint/2010/main" val="3761679462"/>
+      </p:ext>
+    </p:extLst>
+  </p:cSld>
+  <p:clrMapOvr>
+    <a:masterClrMapping/>
+  </p:clrMapOvr>
+</p:sld>
+</file>
+
+<file path=ppt/slides/slide14.xml><?xml version="1.0" encoding="utf-8"?>
+<p:sld xmlns:a="http://schemas.openxmlformats.org/drawingml/2006/main" xmlns:r="http://schemas.openxmlformats.org/officeDocument/2006/relationships" xmlns:p="http://schemas.openxmlformats.org/presentationml/2006/main">
+  <p:cSld>
+    <p:spTree>
+      <p:nvGrpSpPr>
+        <p:cNvPr id="1" name=""/>
+        <p:cNvGrpSpPr/>
+        <p:nvPr/>
+      </p:nvGrpSpPr>
+      <p:grpSpPr>
+        <a:xfrm>
+          <a:off x="0" y="0"/>
+          <a:ext cx="0" cy="0"/>
+          <a:chOff x="0" y="0"/>
+          <a:chExt cx="0" cy="0"/>
+        </a:xfrm>
+      </p:grpSpPr>
+      <p:sp>
+        <p:nvSpPr>
+          <p:cNvPr id="2" name="Title 1">
+            <a:extLst>
+              <a:ext uri="{FF2B5EF4-FFF2-40B4-BE49-F238E27FC236}">
+                <a16:creationId xmlns:a16="http://schemas.microsoft.com/office/drawing/2014/main" id="{2F4E9D32-C6B7-28EF-74CE-15F8FFD098ED}"/>
+              </a:ext>
+            </a:extLst>
+          </p:cNvPr>
+          <p:cNvSpPr>
+            <a:spLocks noGrp="1"/>
+          </p:cNvSpPr>
+          <p:nvPr>
+            <p:ph type="title"/>
+          </p:nvPr>
+        </p:nvSpPr>
+        <p:spPr>
+          <a:xfrm>
+            <a:off x="0" y="18255"/>
+            <a:ext cx="10515600" cy="1325563"/>
+          </a:xfrm>
+        </p:spPr>
+        <p:txBody>
+          <a:bodyPr/>
+          <a:lstStyle/>
+          <a:p>
+            <a:r>
+              <a:rPr lang="en-US" dirty="0"/>
+              <a:t>Qupls4: Reorder Buffer</a:t>
+            </a:r>
+            <a:endParaRPr lang="en-CA" dirty="0"/>
+          </a:p>
+        </p:txBody>
+      </p:sp>
+      <p:sp>
+        <p:nvSpPr>
+          <p:cNvPr id="4" name="Oval 3">
+            <a:extLst>
+              <a:ext uri="{FF2B5EF4-FFF2-40B4-BE49-F238E27FC236}">
+                <a16:creationId xmlns:a16="http://schemas.microsoft.com/office/drawing/2014/main" id="{6864A1F2-123A-850B-3B21-47F855914C43}"/>
+              </a:ext>
+            </a:extLst>
+          </p:cNvPr>
+          <p:cNvSpPr/>
+          <p:nvPr/>
+        </p:nvSpPr>
+        <p:spPr>
+          <a:xfrm>
+            <a:off x="2252868" y="3466453"/>
+            <a:ext cx="1928191" cy="1914939"/>
+          </a:xfrm>
+          <a:prstGeom prst="ellipse">
+            <a:avLst/>
+          </a:prstGeom>
+        </p:spPr>
+        <p:style>
+          <a:lnRef idx="2">
+            <a:schemeClr val="accent1">
+              <a:shade val="15000"/>
+            </a:schemeClr>
+          </a:lnRef>
+          <a:fillRef idx="1">
+            <a:schemeClr val="accent1"/>
+          </a:fillRef>
+          <a:effectRef idx="0">
+            <a:schemeClr val="accent1"/>
+          </a:effectRef>
+          <a:fontRef idx="minor">
+            <a:schemeClr val="lt1"/>
+          </a:fontRef>
+        </p:style>
+        <p:txBody>
+          <a:bodyPr rtlCol="0" anchor="ctr"/>
+          <a:lstStyle/>
+          <a:p>
+            <a:pPr algn="ctr"/>
+            <a:endParaRPr lang="en-CA"/>
+          </a:p>
+        </p:txBody>
+      </p:sp>
+      <p:sp>
+        <p:nvSpPr>
+          <p:cNvPr id="5" name="Rectangle 4">
+            <a:extLst>
+              <a:ext uri="{FF2B5EF4-FFF2-40B4-BE49-F238E27FC236}">
+                <a16:creationId xmlns:a16="http://schemas.microsoft.com/office/drawing/2014/main" id="{6765A915-9A5A-648D-F360-1AAD721CF2F6}"/>
+              </a:ext>
+            </a:extLst>
+          </p:cNvPr>
+          <p:cNvSpPr/>
+          <p:nvPr/>
+        </p:nvSpPr>
+        <p:spPr>
+          <a:xfrm>
+            <a:off x="2898912" y="5282001"/>
+            <a:ext cx="510208" cy="404191"/>
+          </a:xfrm>
+          <a:prstGeom prst="rect">
+            <a:avLst/>
+          </a:prstGeom>
+        </p:spPr>
+        <p:style>
+          <a:lnRef idx="2">
+            <a:schemeClr val="accent1">
+              <a:shade val="15000"/>
+            </a:schemeClr>
+          </a:lnRef>
+          <a:fillRef idx="1">
+            <a:schemeClr val="accent1"/>
+          </a:fillRef>
+          <a:effectRef idx="0">
+            <a:schemeClr val="accent1"/>
+          </a:effectRef>
+          <a:fontRef idx="minor">
+            <a:schemeClr val="lt1"/>
+          </a:fontRef>
+        </p:style>
+        <p:txBody>
+          <a:bodyPr rtlCol="0" anchor="ctr"/>
+          <a:lstStyle/>
+          <a:p>
+            <a:pPr algn="ctr"/>
+            <a:r>
+              <a:rPr lang="en-US" sz="1000" dirty="0"/>
+              <a:t>ROB Entry</a:t>
+            </a:r>
+            <a:endParaRPr lang="en-CA" sz="1000" dirty="0"/>
+          </a:p>
+        </p:txBody>
+      </p:sp>
+      <p:sp>
+        <p:nvSpPr>
+          <p:cNvPr id="6" name="Rectangle 5">
+            <a:extLst>
+              <a:ext uri="{FF2B5EF4-FFF2-40B4-BE49-F238E27FC236}">
+                <a16:creationId xmlns:a16="http://schemas.microsoft.com/office/drawing/2014/main" id="{C07255AE-BDB9-A748-7F0C-E97A1FBF0CC1}"/>
+              </a:ext>
+            </a:extLst>
+          </p:cNvPr>
+          <p:cNvSpPr/>
+          <p:nvPr/>
+        </p:nvSpPr>
+        <p:spPr>
+          <a:xfrm>
+            <a:off x="3670851" y="3466453"/>
+            <a:ext cx="510208" cy="404191"/>
+          </a:xfrm>
+          <a:prstGeom prst="rect">
+            <a:avLst/>
+          </a:prstGeom>
+        </p:spPr>
+        <p:style>
+          <a:lnRef idx="2">
+            <a:schemeClr val="accent1">
+              <a:shade val="15000"/>
+            </a:schemeClr>
+          </a:lnRef>
+          <a:fillRef idx="1">
+            <a:schemeClr val="accent1"/>
+          </a:fillRef>
+          <a:effectRef idx="0">
+            <a:schemeClr val="accent1"/>
+          </a:effectRef>
+          <a:fontRef idx="minor">
+            <a:schemeClr val="lt1"/>
+          </a:fontRef>
+        </p:style>
+        <p:txBody>
+          <a:bodyPr rtlCol="0" anchor="ctr"/>
+          <a:lstStyle/>
+          <a:p>
+            <a:pPr algn="ctr"/>
+            <a:r>
+              <a:rPr lang="en-US" sz="1000" dirty="0"/>
+              <a:t>ROB Entry</a:t>
+            </a:r>
+            <a:endParaRPr lang="en-CA" sz="1000" dirty="0"/>
+          </a:p>
+        </p:txBody>
+      </p:sp>
+      <p:sp>
+        <p:nvSpPr>
+          <p:cNvPr id="7" name="Rectangle 6">
+            <a:extLst>
+              <a:ext uri="{FF2B5EF4-FFF2-40B4-BE49-F238E27FC236}">
+                <a16:creationId xmlns:a16="http://schemas.microsoft.com/office/drawing/2014/main" id="{0DC0C240-5C0C-52AF-16E3-D08EEB75E984}"/>
+              </a:ext>
+            </a:extLst>
+          </p:cNvPr>
+          <p:cNvSpPr/>
+          <p:nvPr/>
+        </p:nvSpPr>
+        <p:spPr>
+          <a:xfrm>
+            <a:off x="2842588" y="3161653"/>
+            <a:ext cx="510208" cy="404191"/>
+          </a:xfrm>
+          <a:prstGeom prst="rect">
+            <a:avLst/>
+          </a:prstGeom>
+        </p:spPr>
+        <p:style>
+          <a:lnRef idx="2">
+            <a:schemeClr val="accent1">
+              <a:shade val="15000"/>
+            </a:schemeClr>
+          </a:lnRef>
+          <a:fillRef idx="1">
+            <a:schemeClr val="accent1"/>
+          </a:fillRef>
+          <a:effectRef idx="0">
+            <a:schemeClr val="accent1"/>
+          </a:effectRef>
+          <a:fontRef idx="minor">
+            <a:schemeClr val="lt1"/>
+          </a:fontRef>
+        </p:style>
+        <p:txBody>
+          <a:bodyPr rtlCol="0" anchor="ctr"/>
+          <a:lstStyle/>
+          <a:p>
+            <a:pPr algn="ctr"/>
+            <a:r>
+              <a:rPr lang="en-US" sz="1000" dirty="0"/>
+              <a:t>ROB Entry</a:t>
+            </a:r>
+            <a:endParaRPr lang="en-CA" sz="1000" dirty="0"/>
+          </a:p>
+        </p:txBody>
+      </p:sp>
+      <p:sp>
+        <p:nvSpPr>
+          <p:cNvPr id="8" name="Rectangle 7">
+            <a:extLst>
+              <a:ext uri="{FF2B5EF4-FFF2-40B4-BE49-F238E27FC236}">
+                <a16:creationId xmlns:a16="http://schemas.microsoft.com/office/drawing/2014/main" id="{BC9B011A-9BAC-FBE7-225E-1EB1F7CC3BE4}"/>
+              </a:ext>
+            </a:extLst>
+          </p:cNvPr>
+          <p:cNvSpPr/>
+          <p:nvPr/>
+        </p:nvSpPr>
+        <p:spPr>
+          <a:xfrm>
+            <a:off x="2037520" y="3569157"/>
+            <a:ext cx="510208" cy="404191"/>
+          </a:xfrm>
+          <a:prstGeom prst="rect">
+            <a:avLst/>
+          </a:prstGeom>
+        </p:spPr>
+        <p:style>
+          <a:lnRef idx="2">
+            <a:schemeClr val="accent1">
+              <a:shade val="15000"/>
+            </a:schemeClr>
+          </a:lnRef>
+          <a:fillRef idx="1">
+            <a:schemeClr val="accent1"/>
+          </a:fillRef>
+          <a:effectRef idx="0">
+            <a:schemeClr val="accent1"/>
+          </a:effectRef>
+          <a:fontRef idx="minor">
+            <a:schemeClr val="lt1"/>
+          </a:fontRef>
+        </p:style>
+        <p:txBody>
+          <a:bodyPr rtlCol="0" anchor="ctr"/>
+          <a:lstStyle/>
+          <a:p>
+            <a:pPr algn="ctr"/>
+            <a:r>
+              <a:rPr lang="en-US" sz="1000" dirty="0"/>
+              <a:t>ROB Entry</a:t>
+            </a:r>
+            <a:endParaRPr lang="en-CA" sz="1000" dirty="0"/>
+          </a:p>
+        </p:txBody>
+      </p:sp>
+      <p:sp>
+        <p:nvSpPr>
+          <p:cNvPr id="9" name="Rectangle 8">
+            <a:extLst>
+              <a:ext uri="{FF2B5EF4-FFF2-40B4-BE49-F238E27FC236}">
+                <a16:creationId xmlns:a16="http://schemas.microsoft.com/office/drawing/2014/main" id="{7E9615B4-C22D-1B51-18D2-958F358AECED}"/>
+              </a:ext>
+            </a:extLst>
+          </p:cNvPr>
+          <p:cNvSpPr/>
+          <p:nvPr/>
+        </p:nvSpPr>
+        <p:spPr>
+          <a:xfrm>
+            <a:off x="1782416" y="4221826"/>
+            <a:ext cx="510208" cy="404191"/>
+          </a:xfrm>
+          <a:prstGeom prst="rect">
+            <a:avLst/>
+          </a:prstGeom>
+        </p:spPr>
+        <p:style>
+          <a:lnRef idx="2">
+            <a:schemeClr val="accent1">
+              <a:shade val="15000"/>
+            </a:schemeClr>
+          </a:lnRef>
+          <a:fillRef idx="1">
+            <a:schemeClr val="accent1"/>
+          </a:fillRef>
+          <a:effectRef idx="0">
+            <a:schemeClr val="accent1"/>
+          </a:effectRef>
+          <a:fontRef idx="minor">
+            <a:schemeClr val="lt1"/>
+          </a:fontRef>
+        </p:style>
+        <p:txBody>
+          <a:bodyPr rtlCol="0" anchor="ctr"/>
+          <a:lstStyle/>
+          <a:p>
+            <a:pPr algn="ctr"/>
+            <a:r>
+              <a:rPr lang="en-US" sz="1000" dirty="0"/>
+              <a:t>ROB Entry</a:t>
+            </a:r>
+            <a:endParaRPr lang="en-CA" sz="1000" dirty="0"/>
+          </a:p>
+        </p:txBody>
+      </p:sp>
+      <p:sp>
+        <p:nvSpPr>
+          <p:cNvPr id="10" name="Rectangle 9">
+            <a:extLst>
+              <a:ext uri="{FF2B5EF4-FFF2-40B4-BE49-F238E27FC236}">
+                <a16:creationId xmlns:a16="http://schemas.microsoft.com/office/drawing/2014/main" id="{CA7F77DC-970B-D4D0-63B8-995288D337E6}"/>
+              </a:ext>
+            </a:extLst>
+          </p:cNvPr>
+          <p:cNvSpPr/>
+          <p:nvPr/>
+        </p:nvSpPr>
+        <p:spPr>
+          <a:xfrm>
+            <a:off x="1997764" y="4899345"/>
+            <a:ext cx="510208" cy="404191"/>
+          </a:xfrm>
+          <a:prstGeom prst="rect">
+            <a:avLst/>
+          </a:prstGeom>
+        </p:spPr>
+        <p:style>
+          <a:lnRef idx="2">
+            <a:schemeClr val="accent1">
+              <a:shade val="15000"/>
+            </a:schemeClr>
+          </a:lnRef>
+          <a:fillRef idx="1">
+            <a:schemeClr val="accent1"/>
+          </a:fillRef>
+          <a:effectRef idx="0">
+            <a:schemeClr val="accent1"/>
+          </a:effectRef>
+          <a:fontRef idx="minor">
+            <a:schemeClr val="lt1"/>
+          </a:fontRef>
+        </p:style>
+        <p:txBody>
+          <a:bodyPr rtlCol="0" anchor="ctr"/>
+          <a:lstStyle/>
+          <a:p>
+            <a:pPr algn="ctr"/>
+            <a:r>
+              <a:rPr lang="en-US" sz="1000" dirty="0"/>
+              <a:t>ROB Entry</a:t>
+            </a:r>
+            <a:endParaRPr lang="en-CA" sz="1000" dirty="0"/>
+          </a:p>
+        </p:txBody>
+      </p:sp>
+      <p:sp>
+        <p:nvSpPr>
+          <p:cNvPr id="11" name="Rectangle 10">
+            <a:extLst>
+              <a:ext uri="{FF2B5EF4-FFF2-40B4-BE49-F238E27FC236}">
+                <a16:creationId xmlns:a16="http://schemas.microsoft.com/office/drawing/2014/main" id="{9D740036-9D2E-E467-DCF1-251ECC6234C0}"/>
+              </a:ext>
+            </a:extLst>
+          </p:cNvPr>
+          <p:cNvSpPr/>
+          <p:nvPr/>
+        </p:nvSpPr>
+        <p:spPr>
+          <a:xfrm>
+            <a:off x="4104860" y="4221826"/>
+            <a:ext cx="510208" cy="404191"/>
+          </a:xfrm>
+          <a:prstGeom prst="rect">
+            <a:avLst/>
+          </a:prstGeom>
+        </p:spPr>
+        <p:style>
+          <a:lnRef idx="2">
+            <a:schemeClr val="accent1">
+              <a:shade val="15000"/>
+            </a:schemeClr>
+          </a:lnRef>
+          <a:fillRef idx="1">
+            <a:schemeClr val="accent1"/>
+          </a:fillRef>
+          <a:effectRef idx="0">
+            <a:schemeClr val="accent1"/>
+          </a:effectRef>
+          <a:fontRef idx="minor">
+            <a:schemeClr val="lt1"/>
+          </a:fontRef>
+        </p:style>
+        <p:txBody>
+          <a:bodyPr rtlCol="0" anchor="ctr"/>
+          <a:lstStyle/>
+          <a:p>
+            <a:pPr algn="ctr"/>
+            <a:r>
+              <a:rPr lang="en-US" sz="1000" dirty="0"/>
+              <a:t>ROB Entry</a:t>
+            </a:r>
+            <a:endParaRPr lang="en-CA" sz="1000" dirty="0"/>
+          </a:p>
+        </p:txBody>
+      </p:sp>
+      <p:sp>
+        <p:nvSpPr>
+          <p:cNvPr id="12" name="Rectangle 11">
+            <a:extLst>
+              <a:ext uri="{FF2B5EF4-FFF2-40B4-BE49-F238E27FC236}">
+                <a16:creationId xmlns:a16="http://schemas.microsoft.com/office/drawing/2014/main" id="{E5BCD9F3-A52B-993E-6537-E8F022C67E8D}"/>
+              </a:ext>
+            </a:extLst>
+          </p:cNvPr>
+          <p:cNvSpPr/>
+          <p:nvPr/>
+        </p:nvSpPr>
+        <p:spPr>
+          <a:xfrm>
+            <a:off x="3899450" y="4930817"/>
+            <a:ext cx="510208" cy="404191"/>
+          </a:xfrm>
+          <a:prstGeom prst="rect">
+            <a:avLst/>
+          </a:prstGeom>
+        </p:spPr>
+        <p:style>
+          <a:lnRef idx="2">
+            <a:schemeClr val="accent1">
+              <a:shade val="15000"/>
+            </a:schemeClr>
+          </a:lnRef>
+          <a:fillRef idx="1">
+            <a:schemeClr val="accent1"/>
+          </a:fillRef>
+          <a:effectRef idx="0">
+            <a:schemeClr val="accent1"/>
+          </a:effectRef>
+          <a:fontRef idx="minor">
+            <a:schemeClr val="lt1"/>
+          </a:fontRef>
+        </p:style>
+        <p:txBody>
+          <a:bodyPr rtlCol="0" anchor="ctr"/>
+          <a:lstStyle/>
+          <a:p>
+            <a:pPr algn="ctr"/>
+            <a:r>
+              <a:rPr lang="en-US" sz="1000" dirty="0"/>
+              <a:t>ROB Entry</a:t>
+            </a:r>
+            <a:endParaRPr lang="en-CA" sz="1000" dirty="0"/>
+          </a:p>
+        </p:txBody>
+      </p:sp>
+      <p:sp>
+        <p:nvSpPr>
+          <p:cNvPr id="14" name="TextBox 13">
+            <a:extLst>
+              <a:ext uri="{FF2B5EF4-FFF2-40B4-BE49-F238E27FC236}">
+                <a16:creationId xmlns:a16="http://schemas.microsoft.com/office/drawing/2014/main" id="{F6BA38B3-80F3-800E-D567-273A93B623F0}"/>
+              </a:ext>
+            </a:extLst>
+          </p:cNvPr>
+          <p:cNvSpPr txBox="1"/>
+          <p:nvPr/>
+        </p:nvSpPr>
+        <p:spPr>
+          <a:xfrm>
+            <a:off x="374983" y="1247621"/>
+            <a:ext cx="7715125" cy="1600438"/>
+          </a:xfrm>
+          <a:prstGeom prst="rect">
+            <a:avLst/>
+          </a:prstGeom>
+          <a:noFill/>
+        </p:spPr>
+        <p:txBody>
+          <a:bodyPr wrap="none" rtlCol="0">
+            <a:spAutoFit/>
+          </a:bodyPr>
+          <a:lstStyle/>
+          <a:p>
+            <a:r>
+              <a:rPr lang="en-US" sz="1400" dirty="0"/>
+              <a:t>The reorder buffer is a circular queue with at least 16 entries (not all entries shown below).</a:t>
+            </a:r>
+          </a:p>
+          <a:p>
+            <a:endParaRPr lang="en-US" sz="1400" dirty="0"/>
+          </a:p>
+          <a:p>
+            <a:r>
+              <a:rPr lang="en-US" sz="1400" dirty="0"/>
+              <a:t>Each ROB entry contains information needed to manage the progress of the instruction (micro-op).</a:t>
+            </a:r>
+          </a:p>
+          <a:p>
+            <a:endParaRPr lang="en-US" sz="1400" dirty="0"/>
+          </a:p>
+          <a:p>
+            <a:r>
+              <a:rPr lang="en-US" sz="1400" dirty="0"/>
+              <a:t>Instructions are added at the tail location and committed from the head location.</a:t>
+            </a:r>
+          </a:p>
+          <a:p>
+            <a:endParaRPr lang="en-US" sz="1400" dirty="0"/>
+          </a:p>
+          <a:p>
+            <a:r>
+              <a:rPr lang="en-US" sz="1400" dirty="0"/>
+              <a:t>The head and tail rotate with the tail always behind the head.</a:t>
+            </a:r>
+            <a:endParaRPr lang="en-CA" sz="1400" dirty="0"/>
+          </a:p>
+        </p:txBody>
+      </p:sp>
+    </p:spTree>
+    <p:extLst>
+      <p:ext uri="{BB962C8B-B14F-4D97-AF65-F5344CB8AC3E}">
+        <p14:creationId xmlns:p14="http://schemas.microsoft.com/office/powerpoint/2010/main" val="3910026719"/>
       </p:ext>
     </p:extLst>
   </p:cSld>

</xml_diff>